<commit_message>
minor annotations to notebook 07_batchnorm_jcat.ipynb
Signed-off-by: Joseph Catanzarite <jcatanza@users.noreply.github.com>
</commit_message>
<xml_diff>
--- a/study_group/meetup_slide_decks/Foundations_Lesson10e.pptx
+++ b/study_group/meetup_slide_decks/Foundations_Lesson10e.pptx
@@ -4,11 +4,12 @@
   <p:sldMasterIdLst>
     <p:sldMasterId id="2147483648" r:id="rId2"/>
     <p:sldMasterId id="2147483661" r:id="rId3"/>
+    <p:sldMasterId id="2147483674" r:id="rId4"/>
   </p:sldMasterIdLst>
   <p:sldIdLst>
-    <p:sldId id="256" r:id="rId4"/>
-    <p:sldId id="257" r:id="rId5"/>
-    <p:sldId id="258" r:id="rId6"/>
+    <p:sldId id="256" r:id="rId5"/>
+    <p:sldId id="257" r:id="rId6"/>
+    <p:sldId id="258" r:id="rId7"/>
   </p:sldIdLst>
   <p:sldSz cx="10080625" cy="5670550"/>
   <p:notesSz cx="7772400" cy="10058400"/>
@@ -67,7 +68,7 @@
         <p:spPr>
           <a:xfrm>
             <a:off x="504000" y="210600"/>
-            <a:ext cx="7018560" cy="946800"/>
+            <a:ext cx="7018200" cy="946800"/>
           </a:xfrm>
           <a:prstGeom prst="rect">
             <a:avLst/>
@@ -98,15 +99,15 @@
         <p:spPr>
           <a:xfrm>
             <a:off x="504000" y="1326600"/>
-            <a:ext cx="1053360" cy="1567800"/>
-          </a:xfrm>
-          <a:prstGeom prst="rect">
-            <a:avLst/>
-          </a:prstGeom>
-        </p:spPr>
-        <p:txBody>
-          <a:bodyPr lIns="0" rIns="0" tIns="0" bIns="0">
-            <a:normAutofit fontScale="34000"/>
+            <a:ext cx="513360" cy="1567800"/>
+          </a:xfrm>
+          <a:prstGeom prst="rect">
+            <a:avLst/>
+          </a:prstGeom>
+        </p:spPr>
+        <p:txBody>
+          <a:bodyPr lIns="0" rIns="0" tIns="0" bIns="0">
+            <a:normAutofit fontScale="9000"/>
           </a:bodyPr>
           <a:p>
             <a:endParaRPr b="0" lang="en-US" sz="3200" spc="-1" strike="noStrike">
@@ -128,15 +129,15 @@
         <p:spPr>
           <a:xfrm>
             <a:off x="504000" y="3043800"/>
-            <a:ext cx="1053360" cy="1567800"/>
-          </a:xfrm>
-          <a:prstGeom prst="rect">
-            <a:avLst/>
-          </a:prstGeom>
-        </p:spPr>
-        <p:txBody>
-          <a:bodyPr lIns="0" rIns="0" tIns="0" bIns="0">
-            <a:normAutofit fontScale="34000"/>
+            <a:ext cx="513360" cy="1567800"/>
+          </a:xfrm>
+          <a:prstGeom prst="rect">
+            <a:avLst/>
+          </a:prstGeom>
+        </p:spPr>
+        <p:txBody>
+          <a:bodyPr lIns="0" rIns="0" tIns="0" bIns="0">
+            <a:normAutofit fontScale="9000"/>
           </a:bodyPr>
           <a:p>
             <a:endParaRPr b="0" lang="en-US" sz="3200" spc="-1" strike="noStrike">
@@ -180,7 +181,7 @@
         <p:spPr>
           <a:xfrm>
             <a:off x="504000" y="210600"/>
-            <a:ext cx="7018560" cy="946800"/>
+            <a:ext cx="7018200" cy="946800"/>
           </a:xfrm>
           <a:prstGeom prst="rect">
             <a:avLst/>
@@ -211,7 +212,7 @@
         <p:spPr>
           <a:xfrm>
             <a:off x="504000" y="1326600"/>
-            <a:ext cx="513720" cy="1567800"/>
+            <a:ext cx="250200" cy="1567800"/>
           </a:xfrm>
           <a:prstGeom prst="rect">
             <a:avLst/>
@@ -240,8 +241,8 @@
         </p:nvSpPr>
         <p:spPr>
           <a:xfrm>
-            <a:off x="1043640" y="1326600"/>
-            <a:ext cx="513720" cy="1567800"/>
+            <a:off x="767160" y="1326600"/>
+            <a:ext cx="250200" cy="1567800"/>
           </a:xfrm>
           <a:prstGeom prst="rect">
             <a:avLst/>
@@ -271,7 +272,7 @@
         <p:spPr>
           <a:xfrm>
             <a:off x="504000" y="3043800"/>
-            <a:ext cx="513720" cy="1567800"/>
+            <a:ext cx="250200" cy="1567800"/>
           </a:xfrm>
           <a:prstGeom prst="rect">
             <a:avLst/>
@@ -300,8 +301,8 @@
         </p:nvSpPr>
         <p:spPr>
           <a:xfrm>
-            <a:off x="1043640" y="3043800"/>
-            <a:ext cx="513720" cy="1567800"/>
+            <a:off x="767160" y="3043800"/>
+            <a:ext cx="250200" cy="1567800"/>
           </a:xfrm>
           <a:prstGeom prst="rect">
             <a:avLst/>
@@ -353,7 +354,7 @@
         <p:spPr>
           <a:xfrm>
             <a:off x="504000" y="210600"/>
-            <a:ext cx="7018560" cy="946800"/>
+            <a:ext cx="7018200" cy="946800"/>
           </a:xfrm>
           <a:prstGeom prst="rect">
             <a:avLst/>
@@ -384,7 +385,7 @@
         <p:spPr>
           <a:xfrm>
             <a:off x="504000" y="1326600"/>
-            <a:ext cx="338760" cy="1567800"/>
+            <a:ext cx="164880" cy="1567800"/>
           </a:xfrm>
           <a:prstGeom prst="rect">
             <a:avLst/>
@@ -413,8 +414,8 @@
         </p:nvSpPr>
         <p:spPr>
           <a:xfrm>
-            <a:off x="860040" y="1326600"/>
-            <a:ext cx="338760" cy="1567800"/>
+            <a:off x="677520" y="1326600"/>
+            <a:ext cx="164880" cy="1567800"/>
           </a:xfrm>
           <a:prstGeom prst="rect">
             <a:avLst/>
@@ -443,8 +444,8 @@
         </p:nvSpPr>
         <p:spPr>
           <a:xfrm>
-            <a:off x="1216080" y="1326600"/>
-            <a:ext cx="338760" cy="1567800"/>
+            <a:off x="851040" y="1326600"/>
+            <a:ext cx="164880" cy="1567800"/>
           </a:xfrm>
           <a:prstGeom prst="rect">
             <a:avLst/>
@@ -474,7 +475,7 @@
         <p:spPr>
           <a:xfrm>
             <a:off x="504000" y="3043800"/>
-            <a:ext cx="338760" cy="1567800"/>
+            <a:ext cx="164880" cy="1567800"/>
           </a:xfrm>
           <a:prstGeom prst="rect">
             <a:avLst/>
@@ -503,8 +504,8 @@
         </p:nvSpPr>
         <p:spPr>
           <a:xfrm>
-            <a:off x="860040" y="3043800"/>
-            <a:ext cx="338760" cy="1567800"/>
+            <a:off x="677520" y="3043800"/>
+            <a:ext cx="164880" cy="1567800"/>
           </a:xfrm>
           <a:prstGeom prst="rect">
             <a:avLst/>
@@ -533,8 +534,8 @@
         </p:nvSpPr>
         <p:spPr>
           <a:xfrm>
-            <a:off x="1216080" y="3043800"/>
-            <a:ext cx="338760" cy="1567800"/>
+            <a:off x="851040" y="3043800"/>
+            <a:ext cx="164880" cy="1567800"/>
           </a:xfrm>
           <a:prstGeom prst="rect">
             <a:avLst/>
@@ -597,7 +598,7 @@
       </p:grpSpPr>
       <p:sp>
         <p:nvSpPr>
-          <p:cNvPr id="43" name="PlaceHolder 1"/>
+          <p:cNvPr id="44" name="PlaceHolder 1"/>
           <p:cNvSpPr>
             <a:spLocks noGrp="1"/>
           </p:cNvSpPr>
@@ -608,7 +609,7 @@
         <p:spPr>
           <a:xfrm>
             <a:off x="504000" y="210600"/>
-            <a:ext cx="7018560" cy="946800"/>
+            <a:ext cx="7018200" cy="946800"/>
           </a:xfrm>
           <a:prstGeom prst="rect">
             <a:avLst/>
@@ -628,7 +629,7 @@
       </p:sp>
       <p:sp>
         <p:nvSpPr>
-          <p:cNvPr id="44" name="PlaceHolder 2"/>
+          <p:cNvPr id="45" name="PlaceHolder 2"/>
           <p:cNvSpPr>
             <a:spLocks noGrp="1"/>
           </p:cNvSpPr>
@@ -639,7 +640,7 @@
         <p:spPr>
           <a:xfrm>
             <a:off x="504000" y="1326600"/>
-            <a:ext cx="1053360" cy="3287520"/>
+            <a:ext cx="513360" cy="3287160"/>
           </a:xfrm>
           <a:prstGeom prst="rect">
             <a:avLst/>
@@ -681,7 +682,7 @@
       </p:grpSpPr>
       <p:sp>
         <p:nvSpPr>
-          <p:cNvPr id="45" name="PlaceHolder 1"/>
+          <p:cNvPr id="46" name="PlaceHolder 1"/>
           <p:cNvSpPr>
             <a:spLocks noGrp="1"/>
           </p:cNvSpPr>
@@ -692,7 +693,7 @@
         <p:spPr>
           <a:xfrm>
             <a:off x="504000" y="210600"/>
-            <a:ext cx="7018560" cy="946800"/>
+            <a:ext cx="7018200" cy="946800"/>
           </a:xfrm>
           <a:prstGeom prst="rect">
             <a:avLst/>
@@ -712,7 +713,7 @@
       </p:sp>
       <p:sp>
         <p:nvSpPr>
-          <p:cNvPr id="46" name="PlaceHolder 2"/>
+          <p:cNvPr id="47" name="PlaceHolder 2"/>
           <p:cNvSpPr>
             <a:spLocks noGrp="1"/>
           </p:cNvSpPr>
@@ -723,15 +724,15 @@
         <p:spPr>
           <a:xfrm>
             <a:off x="504000" y="1326600"/>
-            <a:ext cx="1053360" cy="3287520"/>
-          </a:xfrm>
-          <a:prstGeom prst="rect">
-            <a:avLst/>
-          </a:prstGeom>
-        </p:spPr>
-        <p:txBody>
-          <a:bodyPr lIns="0" rIns="0" tIns="0" bIns="0">
-            <a:normAutofit/>
+            <a:ext cx="513360" cy="3287160"/>
+          </a:xfrm>
+          <a:prstGeom prst="rect">
+            <a:avLst/>
+          </a:prstGeom>
+        </p:spPr>
+        <p:txBody>
+          <a:bodyPr lIns="0" rIns="0" tIns="0" bIns="0">
+            <a:normAutofit fontScale="27000"/>
           </a:bodyPr>
           <a:p>
             <a:endParaRPr b="0" lang="en-US" sz="3200" spc="-1" strike="noStrike">
@@ -764,7 +765,7 @@
       </p:grpSpPr>
       <p:sp>
         <p:nvSpPr>
-          <p:cNvPr id="47" name="PlaceHolder 1"/>
+          <p:cNvPr id="48" name="PlaceHolder 1"/>
           <p:cNvSpPr>
             <a:spLocks noGrp="1"/>
           </p:cNvSpPr>
@@ -775,7 +776,7 @@
         <p:spPr>
           <a:xfrm>
             <a:off x="504000" y="210600"/>
-            <a:ext cx="7018560" cy="946800"/>
+            <a:ext cx="7018200" cy="946800"/>
           </a:xfrm>
           <a:prstGeom prst="rect">
             <a:avLst/>
@@ -795,7 +796,7 @@
       </p:sp>
       <p:sp>
         <p:nvSpPr>
-          <p:cNvPr id="48" name="PlaceHolder 2"/>
+          <p:cNvPr id="49" name="PlaceHolder 2"/>
           <p:cNvSpPr>
             <a:spLocks noGrp="1"/>
           </p:cNvSpPr>
@@ -806,7 +807,7 @@
         <p:spPr>
           <a:xfrm>
             <a:off x="504000" y="1326600"/>
-            <a:ext cx="513720" cy="3287520"/>
+            <a:ext cx="250200" cy="3287160"/>
           </a:xfrm>
           <a:prstGeom prst="rect">
             <a:avLst/>
@@ -825,18 +826,18 @@
       </p:sp>
       <p:sp>
         <p:nvSpPr>
-          <p:cNvPr id="49" name="PlaceHolder 3"/>
-          <p:cNvSpPr>
-            <a:spLocks noGrp="1"/>
-          </p:cNvSpPr>
-          <p:nvPr>
-            <p:ph type="body"/>
-          </p:nvPr>
-        </p:nvSpPr>
-        <p:spPr>
-          <a:xfrm>
-            <a:off x="1043640" y="1326600"/>
-            <a:ext cx="513720" cy="3287520"/>
+          <p:cNvPr id="50" name="PlaceHolder 3"/>
+          <p:cNvSpPr>
+            <a:spLocks noGrp="1"/>
+          </p:cNvSpPr>
+          <p:nvPr>
+            <p:ph type="body"/>
+          </p:nvPr>
+        </p:nvSpPr>
+        <p:spPr>
+          <a:xfrm>
+            <a:off x="767160" y="1326600"/>
+            <a:ext cx="250200" cy="3287160"/>
           </a:xfrm>
           <a:prstGeom prst="rect">
             <a:avLst/>
@@ -877,7 +878,7 @@
       </p:grpSpPr>
       <p:sp>
         <p:nvSpPr>
-          <p:cNvPr id="50" name="PlaceHolder 1"/>
+          <p:cNvPr id="51" name="PlaceHolder 1"/>
           <p:cNvSpPr>
             <a:spLocks noGrp="1"/>
           </p:cNvSpPr>
@@ -888,7 +889,7 @@
         <p:spPr>
           <a:xfrm>
             <a:off x="504000" y="210600"/>
-            <a:ext cx="7018560" cy="946800"/>
+            <a:ext cx="7018200" cy="946800"/>
           </a:xfrm>
           <a:prstGeom prst="rect">
             <a:avLst/>
@@ -930,7 +931,7 @@
       </p:grpSpPr>
       <p:sp>
         <p:nvSpPr>
-          <p:cNvPr id="51" name="PlaceHolder 1"/>
+          <p:cNvPr id="52" name="PlaceHolder 1"/>
           <p:cNvSpPr>
             <a:spLocks noGrp="1"/>
           </p:cNvSpPr>
@@ -941,7 +942,7 @@
         <p:spPr>
           <a:xfrm>
             <a:off x="504000" y="210600"/>
-            <a:ext cx="7018560" cy="4390200"/>
+            <a:ext cx="7018200" cy="4390200"/>
           </a:xfrm>
           <a:prstGeom prst="rect">
             <a:avLst/>
@@ -983,7 +984,7 @@
       </p:grpSpPr>
       <p:sp>
         <p:nvSpPr>
-          <p:cNvPr id="52" name="PlaceHolder 1"/>
+          <p:cNvPr id="53" name="PlaceHolder 1"/>
           <p:cNvSpPr>
             <a:spLocks noGrp="1"/>
           </p:cNvSpPr>
@@ -994,7 +995,7 @@
         <p:spPr>
           <a:xfrm>
             <a:off x="504000" y="210600"/>
-            <a:ext cx="7018560" cy="946800"/>
+            <a:ext cx="7018200" cy="946800"/>
           </a:xfrm>
           <a:prstGeom prst="rect">
             <a:avLst/>
@@ -1014,7 +1015,7 @@
       </p:sp>
       <p:sp>
         <p:nvSpPr>
-          <p:cNvPr id="53" name="PlaceHolder 2"/>
+          <p:cNvPr id="54" name="PlaceHolder 2"/>
           <p:cNvSpPr>
             <a:spLocks noGrp="1"/>
           </p:cNvSpPr>
@@ -1025,7 +1026,7 @@
         <p:spPr>
           <a:xfrm>
             <a:off x="504000" y="1326600"/>
-            <a:ext cx="513720" cy="1567800"/>
+            <a:ext cx="250200" cy="1567800"/>
           </a:xfrm>
           <a:prstGeom prst="rect">
             <a:avLst/>
@@ -1044,18 +1045,18 @@
       </p:sp>
       <p:sp>
         <p:nvSpPr>
-          <p:cNvPr id="54" name="PlaceHolder 3"/>
-          <p:cNvSpPr>
-            <a:spLocks noGrp="1"/>
-          </p:cNvSpPr>
-          <p:nvPr>
-            <p:ph type="body"/>
-          </p:nvPr>
-        </p:nvSpPr>
-        <p:spPr>
-          <a:xfrm>
-            <a:off x="1043640" y="1326600"/>
-            <a:ext cx="513720" cy="3287520"/>
+          <p:cNvPr id="55" name="PlaceHolder 3"/>
+          <p:cNvSpPr>
+            <a:spLocks noGrp="1"/>
+          </p:cNvSpPr>
+          <p:nvPr>
+            <p:ph type="body"/>
+          </p:nvPr>
+        </p:nvSpPr>
+        <p:spPr>
+          <a:xfrm>
+            <a:off x="767160" y="1326600"/>
+            <a:ext cx="250200" cy="3287160"/>
           </a:xfrm>
           <a:prstGeom prst="rect">
             <a:avLst/>
@@ -1074,7 +1075,7 @@
       </p:sp>
       <p:sp>
         <p:nvSpPr>
-          <p:cNvPr id="55" name="PlaceHolder 4"/>
+          <p:cNvPr id="56" name="PlaceHolder 4"/>
           <p:cNvSpPr>
             <a:spLocks noGrp="1"/>
           </p:cNvSpPr>
@@ -1085,7 +1086,7 @@
         <p:spPr>
           <a:xfrm>
             <a:off x="504000" y="3043800"/>
-            <a:ext cx="513720" cy="1567800"/>
+            <a:ext cx="250200" cy="1567800"/>
           </a:xfrm>
           <a:prstGeom prst="rect">
             <a:avLst/>
@@ -1137,7 +1138,7 @@
         <p:spPr>
           <a:xfrm>
             <a:off x="504000" y="210600"/>
-            <a:ext cx="7018560" cy="946800"/>
+            <a:ext cx="7018200" cy="946800"/>
           </a:xfrm>
           <a:prstGeom prst="rect">
             <a:avLst/>
@@ -1168,7 +1169,7 @@
         <p:spPr>
           <a:xfrm>
             <a:off x="504000" y="1326600"/>
-            <a:ext cx="1053360" cy="3287520"/>
+            <a:ext cx="513360" cy="3287160"/>
           </a:xfrm>
           <a:prstGeom prst="rect">
             <a:avLst/>
@@ -1210,7 +1211,7 @@
       </p:grpSpPr>
       <p:sp>
         <p:nvSpPr>
-          <p:cNvPr id="56" name="PlaceHolder 1"/>
+          <p:cNvPr id="57" name="PlaceHolder 1"/>
           <p:cNvSpPr>
             <a:spLocks noGrp="1"/>
           </p:cNvSpPr>
@@ -1221,7 +1222,7 @@
         <p:spPr>
           <a:xfrm>
             <a:off x="504000" y="210600"/>
-            <a:ext cx="7018560" cy="946800"/>
+            <a:ext cx="7018200" cy="946800"/>
           </a:xfrm>
           <a:prstGeom prst="rect">
             <a:avLst/>
@@ -1241,7 +1242,7 @@
       </p:sp>
       <p:sp>
         <p:nvSpPr>
-          <p:cNvPr id="57" name="PlaceHolder 2"/>
+          <p:cNvPr id="58" name="PlaceHolder 2"/>
           <p:cNvSpPr>
             <a:spLocks noGrp="1"/>
           </p:cNvSpPr>
@@ -1252,7 +1253,7 @@
         <p:spPr>
           <a:xfrm>
             <a:off x="504000" y="1326600"/>
-            <a:ext cx="513720" cy="3287520"/>
+            <a:ext cx="250200" cy="3287160"/>
           </a:xfrm>
           <a:prstGeom prst="rect">
             <a:avLst/>
@@ -1271,18 +1272,18 @@
       </p:sp>
       <p:sp>
         <p:nvSpPr>
-          <p:cNvPr id="58" name="PlaceHolder 3"/>
-          <p:cNvSpPr>
-            <a:spLocks noGrp="1"/>
-          </p:cNvSpPr>
-          <p:nvPr>
-            <p:ph type="body"/>
-          </p:nvPr>
-        </p:nvSpPr>
-        <p:spPr>
-          <a:xfrm>
-            <a:off x="1043640" y="1326600"/>
-            <a:ext cx="513720" cy="1567800"/>
+          <p:cNvPr id="59" name="PlaceHolder 3"/>
+          <p:cNvSpPr>
+            <a:spLocks noGrp="1"/>
+          </p:cNvSpPr>
+          <p:nvPr>
+            <p:ph type="body"/>
+          </p:nvPr>
+        </p:nvSpPr>
+        <p:spPr>
+          <a:xfrm>
+            <a:off x="767160" y="1326600"/>
+            <a:ext cx="250200" cy="1567800"/>
           </a:xfrm>
           <a:prstGeom prst="rect">
             <a:avLst/>
@@ -1301,18 +1302,18 @@
       </p:sp>
       <p:sp>
         <p:nvSpPr>
-          <p:cNvPr id="59" name="PlaceHolder 4"/>
-          <p:cNvSpPr>
-            <a:spLocks noGrp="1"/>
-          </p:cNvSpPr>
-          <p:nvPr>
-            <p:ph type="body"/>
-          </p:nvPr>
-        </p:nvSpPr>
-        <p:spPr>
-          <a:xfrm>
-            <a:off x="1043640" y="3043800"/>
-            <a:ext cx="513720" cy="1567800"/>
+          <p:cNvPr id="60" name="PlaceHolder 4"/>
+          <p:cNvSpPr>
+            <a:spLocks noGrp="1"/>
+          </p:cNvSpPr>
+          <p:nvPr>
+            <p:ph type="body"/>
+          </p:nvPr>
+        </p:nvSpPr>
+        <p:spPr>
+          <a:xfrm>
+            <a:off x="767160" y="3043800"/>
+            <a:ext cx="250200" cy="1567800"/>
           </a:xfrm>
           <a:prstGeom prst="rect">
             <a:avLst/>
@@ -1353,7 +1354,7 @@
       </p:grpSpPr>
       <p:sp>
         <p:nvSpPr>
-          <p:cNvPr id="60" name="PlaceHolder 1"/>
+          <p:cNvPr id="61" name="PlaceHolder 1"/>
           <p:cNvSpPr>
             <a:spLocks noGrp="1"/>
           </p:cNvSpPr>
@@ -1364,7 +1365,7 @@
         <p:spPr>
           <a:xfrm>
             <a:off x="504000" y="210600"/>
-            <a:ext cx="7018560" cy="946800"/>
+            <a:ext cx="7018200" cy="946800"/>
           </a:xfrm>
           <a:prstGeom prst="rect">
             <a:avLst/>
@@ -1384,7 +1385,7 @@
       </p:sp>
       <p:sp>
         <p:nvSpPr>
-          <p:cNvPr id="61" name="PlaceHolder 2"/>
+          <p:cNvPr id="62" name="PlaceHolder 2"/>
           <p:cNvSpPr>
             <a:spLocks noGrp="1"/>
           </p:cNvSpPr>
@@ -1395,7 +1396,7 @@
         <p:spPr>
           <a:xfrm>
             <a:off x="504000" y="1326600"/>
-            <a:ext cx="513720" cy="1567800"/>
+            <a:ext cx="250200" cy="1567800"/>
           </a:xfrm>
           <a:prstGeom prst="rect">
             <a:avLst/>
@@ -1414,18 +1415,18 @@
       </p:sp>
       <p:sp>
         <p:nvSpPr>
-          <p:cNvPr id="62" name="PlaceHolder 3"/>
-          <p:cNvSpPr>
-            <a:spLocks noGrp="1"/>
-          </p:cNvSpPr>
-          <p:nvPr>
-            <p:ph type="body"/>
-          </p:nvPr>
-        </p:nvSpPr>
-        <p:spPr>
-          <a:xfrm>
-            <a:off x="1043640" y="1326600"/>
-            <a:ext cx="513720" cy="1567800"/>
+          <p:cNvPr id="63" name="PlaceHolder 3"/>
+          <p:cNvSpPr>
+            <a:spLocks noGrp="1"/>
+          </p:cNvSpPr>
+          <p:nvPr>
+            <p:ph type="body"/>
+          </p:nvPr>
+        </p:nvSpPr>
+        <p:spPr>
+          <a:xfrm>
+            <a:off x="767160" y="1326600"/>
+            <a:ext cx="250200" cy="1567800"/>
           </a:xfrm>
           <a:prstGeom prst="rect">
             <a:avLst/>
@@ -1444,7 +1445,7 @@
       </p:sp>
       <p:sp>
         <p:nvSpPr>
-          <p:cNvPr id="63" name="PlaceHolder 4"/>
+          <p:cNvPr id="64" name="PlaceHolder 4"/>
           <p:cNvSpPr>
             <a:spLocks noGrp="1"/>
           </p:cNvSpPr>
@@ -1455,15 +1456,15 @@
         <p:spPr>
           <a:xfrm>
             <a:off x="504000" y="3043800"/>
-            <a:ext cx="1053360" cy="1567800"/>
-          </a:xfrm>
-          <a:prstGeom prst="rect">
-            <a:avLst/>
-          </a:prstGeom>
-        </p:spPr>
-        <p:txBody>
-          <a:bodyPr lIns="0" rIns="0" tIns="0" bIns="0">
-            <a:normAutofit fontScale="34000"/>
+            <a:ext cx="513360" cy="1567800"/>
+          </a:xfrm>
+          <a:prstGeom prst="rect">
+            <a:avLst/>
+          </a:prstGeom>
+        </p:spPr>
+        <p:txBody>
+          <a:bodyPr lIns="0" rIns="0" tIns="0" bIns="0">
+            <a:normAutofit fontScale="9000"/>
           </a:bodyPr>
           <a:p>
             <a:endParaRPr b="0" lang="en-US" sz="3200" spc="-1" strike="noStrike">
@@ -1496,7 +1497,7 @@
       </p:grpSpPr>
       <p:sp>
         <p:nvSpPr>
-          <p:cNvPr id="64" name="PlaceHolder 1"/>
+          <p:cNvPr id="65" name="PlaceHolder 1"/>
           <p:cNvSpPr>
             <a:spLocks noGrp="1"/>
           </p:cNvSpPr>
@@ -1507,7 +1508,7 @@
         <p:spPr>
           <a:xfrm>
             <a:off x="504000" y="210600"/>
-            <a:ext cx="7018560" cy="946800"/>
+            <a:ext cx="7018200" cy="946800"/>
           </a:xfrm>
           <a:prstGeom prst="rect">
             <a:avLst/>
@@ -1527,7 +1528,7 @@
       </p:sp>
       <p:sp>
         <p:nvSpPr>
-          <p:cNvPr id="65" name="PlaceHolder 2"/>
+          <p:cNvPr id="66" name="PlaceHolder 2"/>
           <p:cNvSpPr>
             <a:spLocks noGrp="1"/>
           </p:cNvSpPr>
@@ -1538,26 +1539,26 @@
         <p:spPr>
           <a:xfrm>
             <a:off x="504000" y="1326600"/>
-            <a:ext cx="1053360" cy="1567800"/>
-          </a:xfrm>
-          <a:prstGeom prst="rect">
-            <a:avLst/>
-          </a:prstGeom>
-        </p:spPr>
-        <p:txBody>
-          <a:bodyPr lIns="0" rIns="0" tIns="0" bIns="0">
-            <a:normAutofit fontScale="34000"/>
-          </a:bodyPr>
-          <a:p>
-            <a:endParaRPr b="0" lang="en-US" sz="3200" spc="-1" strike="noStrike">
-              <a:latin typeface="Arial"/>
-            </a:endParaRPr>
-          </a:p>
-        </p:txBody>
-      </p:sp>
-      <p:sp>
-        <p:nvSpPr>
-          <p:cNvPr id="66" name="PlaceHolder 3"/>
+            <a:ext cx="513360" cy="1567800"/>
+          </a:xfrm>
+          <a:prstGeom prst="rect">
+            <a:avLst/>
+          </a:prstGeom>
+        </p:spPr>
+        <p:txBody>
+          <a:bodyPr lIns="0" rIns="0" tIns="0" bIns="0">
+            <a:normAutofit fontScale="9000"/>
+          </a:bodyPr>
+          <a:p>
+            <a:endParaRPr b="0" lang="en-US" sz="3200" spc="-1" strike="noStrike">
+              <a:latin typeface="Arial"/>
+            </a:endParaRPr>
+          </a:p>
+        </p:txBody>
+      </p:sp>
+      <p:sp>
+        <p:nvSpPr>
+          <p:cNvPr id="67" name="PlaceHolder 3"/>
           <p:cNvSpPr>
             <a:spLocks noGrp="1"/>
           </p:cNvSpPr>
@@ -1568,15 +1569,15 @@
         <p:spPr>
           <a:xfrm>
             <a:off x="504000" y="3043800"/>
-            <a:ext cx="1053360" cy="1567800"/>
-          </a:xfrm>
-          <a:prstGeom prst="rect">
-            <a:avLst/>
-          </a:prstGeom>
-        </p:spPr>
-        <p:txBody>
-          <a:bodyPr lIns="0" rIns="0" tIns="0" bIns="0">
-            <a:normAutofit fontScale="34000"/>
+            <a:ext cx="513360" cy="1567800"/>
+          </a:xfrm>
+          <a:prstGeom prst="rect">
+            <a:avLst/>
+          </a:prstGeom>
+        </p:spPr>
+        <p:txBody>
+          <a:bodyPr lIns="0" rIns="0" tIns="0" bIns="0">
+            <a:normAutofit fontScale="9000"/>
           </a:bodyPr>
           <a:p>
             <a:endParaRPr b="0" lang="en-US" sz="3200" spc="-1" strike="noStrike">
@@ -1609,7 +1610,7 @@
       </p:grpSpPr>
       <p:sp>
         <p:nvSpPr>
-          <p:cNvPr id="67" name="PlaceHolder 1"/>
+          <p:cNvPr id="68" name="PlaceHolder 1"/>
           <p:cNvSpPr>
             <a:spLocks noGrp="1"/>
           </p:cNvSpPr>
@@ -1620,7 +1621,7 @@
         <p:spPr>
           <a:xfrm>
             <a:off x="504000" y="210600"/>
-            <a:ext cx="7018560" cy="946800"/>
+            <a:ext cx="7018200" cy="946800"/>
           </a:xfrm>
           <a:prstGeom prst="rect">
             <a:avLst/>
@@ -1640,7 +1641,7 @@
       </p:sp>
       <p:sp>
         <p:nvSpPr>
-          <p:cNvPr id="68" name="PlaceHolder 2"/>
+          <p:cNvPr id="69" name="PlaceHolder 2"/>
           <p:cNvSpPr>
             <a:spLocks noGrp="1"/>
           </p:cNvSpPr>
@@ -1651,7 +1652,7 @@
         <p:spPr>
           <a:xfrm>
             <a:off x="504000" y="1326600"/>
-            <a:ext cx="513720" cy="1567800"/>
+            <a:ext cx="250200" cy="1567800"/>
           </a:xfrm>
           <a:prstGeom prst="rect">
             <a:avLst/>
@@ -1670,18 +1671,18 @@
       </p:sp>
       <p:sp>
         <p:nvSpPr>
-          <p:cNvPr id="69" name="PlaceHolder 3"/>
-          <p:cNvSpPr>
-            <a:spLocks noGrp="1"/>
-          </p:cNvSpPr>
-          <p:nvPr>
-            <p:ph type="body"/>
-          </p:nvPr>
-        </p:nvSpPr>
-        <p:spPr>
-          <a:xfrm>
-            <a:off x="1043640" y="1326600"/>
-            <a:ext cx="513720" cy="1567800"/>
+          <p:cNvPr id="70" name="PlaceHolder 3"/>
+          <p:cNvSpPr>
+            <a:spLocks noGrp="1"/>
+          </p:cNvSpPr>
+          <p:nvPr>
+            <p:ph type="body"/>
+          </p:nvPr>
+        </p:nvSpPr>
+        <p:spPr>
+          <a:xfrm>
+            <a:off x="767160" y="1326600"/>
+            <a:ext cx="250200" cy="1567800"/>
           </a:xfrm>
           <a:prstGeom prst="rect">
             <a:avLst/>
@@ -1700,7 +1701,7 @@
       </p:sp>
       <p:sp>
         <p:nvSpPr>
-          <p:cNvPr id="70" name="PlaceHolder 4"/>
+          <p:cNvPr id="71" name="PlaceHolder 4"/>
           <p:cNvSpPr>
             <a:spLocks noGrp="1"/>
           </p:cNvSpPr>
@@ -1711,7 +1712,7 @@
         <p:spPr>
           <a:xfrm>
             <a:off x="504000" y="3043800"/>
-            <a:ext cx="513720" cy="1567800"/>
+            <a:ext cx="250200" cy="1567800"/>
           </a:xfrm>
           <a:prstGeom prst="rect">
             <a:avLst/>
@@ -1730,18 +1731,18 @@
       </p:sp>
       <p:sp>
         <p:nvSpPr>
-          <p:cNvPr id="71" name="PlaceHolder 5"/>
-          <p:cNvSpPr>
-            <a:spLocks noGrp="1"/>
-          </p:cNvSpPr>
-          <p:nvPr>
-            <p:ph type="body"/>
-          </p:nvPr>
-        </p:nvSpPr>
-        <p:spPr>
-          <a:xfrm>
-            <a:off x="1043640" y="3043800"/>
-            <a:ext cx="513720" cy="1567800"/>
+          <p:cNvPr id="72" name="PlaceHolder 5"/>
+          <p:cNvSpPr>
+            <a:spLocks noGrp="1"/>
+          </p:cNvSpPr>
+          <p:nvPr>
+            <p:ph type="body"/>
+          </p:nvPr>
+        </p:nvSpPr>
+        <p:spPr>
+          <a:xfrm>
+            <a:off x="767160" y="3043800"/>
+            <a:ext cx="250200" cy="1567800"/>
           </a:xfrm>
           <a:prstGeom prst="rect">
             <a:avLst/>
@@ -1782,7 +1783,7 @@
       </p:grpSpPr>
       <p:sp>
         <p:nvSpPr>
-          <p:cNvPr id="72" name="PlaceHolder 1"/>
+          <p:cNvPr id="73" name="PlaceHolder 1"/>
           <p:cNvSpPr>
             <a:spLocks noGrp="1"/>
           </p:cNvSpPr>
@@ -1793,7 +1794,7 @@
         <p:spPr>
           <a:xfrm>
             <a:off x="504000" y="210600"/>
-            <a:ext cx="7018560" cy="946800"/>
+            <a:ext cx="7018200" cy="946800"/>
           </a:xfrm>
           <a:prstGeom prst="rect">
             <a:avLst/>
@@ -1813,7 +1814,7 @@
       </p:sp>
       <p:sp>
         <p:nvSpPr>
-          <p:cNvPr id="73" name="PlaceHolder 2"/>
+          <p:cNvPr id="74" name="PlaceHolder 2"/>
           <p:cNvSpPr>
             <a:spLocks noGrp="1"/>
           </p:cNvSpPr>
@@ -1824,7 +1825,7 @@
         <p:spPr>
           <a:xfrm>
             <a:off x="504000" y="1326600"/>
-            <a:ext cx="338760" cy="1567800"/>
+            <a:ext cx="164880" cy="1567800"/>
           </a:xfrm>
           <a:prstGeom prst="rect">
             <a:avLst/>
@@ -1843,18 +1844,18 @@
       </p:sp>
       <p:sp>
         <p:nvSpPr>
-          <p:cNvPr id="74" name="PlaceHolder 3"/>
-          <p:cNvSpPr>
-            <a:spLocks noGrp="1"/>
-          </p:cNvSpPr>
-          <p:nvPr>
-            <p:ph type="body"/>
-          </p:nvPr>
-        </p:nvSpPr>
-        <p:spPr>
-          <a:xfrm>
-            <a:off x="860040" y="1326600"/>
-            <a:ext cx="338760" cy="1567800"/>
+          <p:cNvPr id="75" name="PlaceHolder 3"/>
+          <p:cNvSpPr>
+            <a:spLocks noGrp="1"/>
+          </p:cNvSpPr>
+          <p:nvPr>
+            <p:ph type="body"/>
+          </p:nvPr>
+        </p:nvSpPr>
+        <p:spPr>
+          <a:xfrm>
+            <a:off x="677520" y="1326600"/>
+            <a:ext cx="164880" cy="1567800"/>
           </a:xfrm>
           <a:prstGeom prst="rect">
             <a:avLst/>
@@ -1873,18 +1874,18 @@
       </p:sp>
       <p:sp>
         <p:nvSpPr>
-          <p:cNvPr id="75" name="PlaceHolder 4"/>
-          <p:cNvSpPr>
-            <a:spLocks noGrp="1"/>
-          </p:cNvSpPr>
-          <p:nvPr>
-            <p:ph type="body"/>
-          </p:nvPr>
-        </p:nvSpPr>
-        <p:spPr>
-          <a:xfrm>
-            <a:off x="1216080" y="1326600"/>
-            <a:ext cx="338760" cy="1567800"/>
+          <p:cNvPr id="76" name="PlaceHolder 4"/>
+          <p:cNvSpPr>
+            <a:spLocks noGrp="1"/>
+          </p:cNvSpPr>
+          <p:nvPr>
+            <p:ph type="body"/>
+          </p:nvPr>
+        </p:nvSpPr>
+        <p:spPr>
+          <a:xfrm>
+            <a:off x="851040" y="1326600"/>
+            <a:ext cx="164880" cy="1567800"/>
           </a:xfrm>
           <a:prstGeom prst="rect">
             <a:avLst/>
@@ -1903,7 +1904,7 @@
       </p:sp>
       <p:sp>
         <p:nvSpPr>
-          <p:cNvPr id="76" name="PlaceHolder 5"/>
+          <p:cNvPr id="77" name="PlaceHolder 5"/>
           <p:cNvSpPr>
             <a:spLocks noGrp="1"/>
           </p:cNvSpPr>
@@ -1914,7 +1915,7 @@
         <p:spPr>
           <a:xfrm>
             <a:off x="504000" y="3043800"/>
-            <a:ext cx="338760" cy="1567800"/>
+            <a:ext cx="164880" cy="1567800"/>
           </a:xfrm>
           <a:prstGeom prst="rect">
             <a:avLst/>
@@ -1933,18 +1934,18 @@
       </p:sp>
       <p:sp>
         <p:nvSpPr>
-          <p:cNvPr id="77" name="PlaceHolder 6"/>
-          <p:cNvSpPr>
-            <a:spLocks noGrp="1"/>
-          </p:cNvSpPr>
-          <p:nvPr>
-            <p:ph type="body"/>
-          </p:nvPr>
-        </p:nvSpPr>
-        <p:spPr>
-          <a:xfrm>
-            <a:off x="860040" y="3043800"/>
-            <a:ext cx="338760" cy="1567800"/>
+          <p:cNvPr id="78" name="PlaceHolder 6"/>
+          <p:cNvSpPr>
+            <a:spLocks noGrp="1"/>
+          </p:cNvSpPr>
+          <p:nvPr>
+            <p:ph type="body"/>
+          </p:nvPr>
+        </p:nvSpPr>
+        <p:spPr>
+          <a:xfrm>
+            <a:off x="677520" y="3043800"/>
+            <a:ext cx="164880" cy="1567800"/>
           </a:xfrm>
           <a:prstGeom prst="rect">
             <a:avLst/>
@@ -1963,18 +1964,18 @@
       </p:sp>
       <p:sp>
         <p:nvSpPr>
-          <p:cNvPr id="78" name="PlaceHolder 7"/>
-          <p:cNvSpPr>
-            <a:spLocks noGrp="1"/>
-          </p:cNvSpPr>
-          <p:nvPr>
-            <p:ph type="body"/>
-          </p:nvPr>
-        </p:nvSpPr>
-        <p:spPr>
-          <a:xfrm>
-            <a:off x="1216080" y="3043800"/>
-            <a:ext cx="338760" cy="1567800"/>
+          <p:cNvPr id="79" name="PlaceHolder 7"/>
+          <p:cNvSpPr>
+            <a:spLocks noGrp="1"/>
+          </p:cNvSpPr>
+          <p:nvPr>
+            <p:ph type="body"/>
+          </p:nvPr>
+        </p:nvSpPr>
+        <p:spPr>
+          <a:xfrm>
+            <a:off x="851040" y="3043800"/>
+            <a:ext cx="164880" cy="1567800"/>
           </a:xfrm>
           <a:prstGeom prst="rect">
             <a:avLst/>
@@ -1986,6 +1987,361 @@
           </a:bodyPr>
           <a:p>
             <a:endParaRPr b="0" lang="en-US" sz="3200" spc="-1" strike="noStrike">
+              <a:latin typeface="Arial"/>
+            </a:endParaRPr>
+          </a:p>
+        </p:txBody>
+      </p:sp>
+    </p:spTree>
+  </p:cSld>
+</p:sldLayout>
+</file>
+
+<file path=ppt/slideLayouts/slideLayout25.xml><?xml version="1.0" encoding="utf-8"?>
+<p:sldLayout xmlns:a="http://schemas.openxmlformats.org/drawingml/2006/main" xmlns:p="http://schemas.openxmlformats.org/presentationml/2006/main" xmlns:r="http://schemas.openxmlformats.org/officeDocument/2006/relationships" xmlns:p14="http://schemas.microsoft.com/office/powerpoint/2010/main" xmlns:p15="http://schemas.microsoft.com/office/powerpoint/2012/main" xmlns:mc="http://schemas.openxmlformats.org/markup-compatibility/2006" type="blank" preserve="1">
+  <p:cSld name="Blank Slide">
+    <p:spTree>
+      <p:nvGrpSpPr>
+        <p:cNvPr id="1" name=""/>
+        <p:cNvGrpSpPr/>
+        <p:nvPr/>
+      </p:nvGrpSpPr>
+      <p:grpSpPr>
+        <a:xfrm>
+          <a:off x="0" y="0"/>
+          <a:ext cx="0" cy="0"/>
+          <a:chOff x="0" y="0"/>
+          <a:chExt cx="0" cy="0"/>
+        </a:xfrm>
+      </p:grpSpPr>
+    </p:spTree>
+  </p:cSld>
+</p:sldLayout>
+</file>
+
+<file path=ppt/slideLayouts/slideLayout26.xml><?xml version="1.0" encoding="utf-8"?>
+<p:sldLayout xmlns:a="http://schemas.openxmlformats.org/drawingml/2006/main" xmlns:p="http://schemas.openxmlformats.org/presentationml/2006/main" xmlns:r="http://schemas.openxmlformats.org/officeDocument/2006/relationships" xmlns:p14="http://schemas.microsoft.com/office/powerpoint/2010/main" xmlns:p15="http://schemas.microsoft.com/office/powerpoint/2012/main" xmlns:mc="http://schemas.openxmlformats.org/markup-compatibility/2006" type="tx" preserve="1">
+  <p:cSld name="Title Slide">
+    <p:spTree>
+      <p:nvGrpSpPr>
+        <p:cNvPr id="1" name=""/>
+        <p:cNvGrpSpPr/>
+        <p:nvPr/>
+      </p:nvGrpSpPr>
+      <p:grpSpPr>
+        <a:xfrm>
+          <a:off x="0" y="0"/>
+          <a:ext cx="0" cy="0"/>
+          <a:chOff x="0" y="0"/>
+          <a:chExt cx="0" cy="0"/>
+        </a:xfrm>
+      </p:grpSpPr>
+      <p:sp>
+        <p:nvSpPr>
+          <p:cNvPr id="84" name="PlaceHolder 1"/>
+          <p:cNvSpPr>
+            <a:spLocks noGrp="1"/>
+          </p:cNvSpPr>
+          <p:nvPr>
+            <p:ph type="title"/>
+          </p:nvPr>
+        </p:nvSpPr>
+        <p:spPr>
+          <a:xfrm>
+            <a:off x="504000" y="210600"/>
+            <a:ext cx="7018200" cy="946800"/>
+          </a:xfrm>
+          <a:prstGeom prst="rect">
+            <a:avLst/>
+          </a:prstGeom>
+        </p:spPr>
+        <p:txBody>
+          <a:bodyPr lIns="0" rIns="0" tIns="0" bIns="0" anchor="ctr">
+            <a:spAutoFit/>
+          </a:bodyPr>
+          <a:p>
+            <a:pPr algn="ctr"/>
+            <a:endParaRPr b="0" lang="en-US" sz="4400" spc="-1" strike="noStrike">
+              <a:latin typeface="Arial"/>
+            </a:endParaRPr>
+          </a:p>
+        </p:txBody>
+      </p:sp>
+      <p:sp>
+        <p:nvSpPr>
+          <p:cNvPr id="85" name="PlaceHolder 2"/>
+          <p:cNvSpPr>
+            <a:spLocks noGrp="1"/>
+          </p:cNvSpPr>
+          <p:nvPr>
+            <p:ph type="subTitle"/>
+          </p:nvPr>
+        </p:nvSpPr>
+        <p:spPr>
+          <a:xfrm>
+            <a:off x="504000" y="1326600"/>
+            <a:ext cx="513360" cy="3287160"/>
+          </a:xfrm>
+          <a:prstGeom prst="rect">
+            <a:avLst/>
+          </a:prstGeom>
+        </p:spPr>
+        <p:txBody>
+          <a:bodyPr lIns="0" rIns="0" tIns="0" bIns="0" anchor="ctr">
+            <a:spAutoFit/>
+          </a:bodyPr>
+          <a:p>
+            <a:pPr algn="ctr"/>
+            <a:endParaRPr b="0" lang="en-US" sz="3200" spc="-1" strike="noStrike">
+              <a:latin typeface="Arial"/>
+            </a:endParaRPr>
+          </a:p>
+        </p:txBody>
+      </p:sp>
+    </p:spTree>
+  </p:cSld>
+</p:sldLayout>
+</file>
+
+<file path=ppt/slideLayouts/slideLayout27.xml><?xml version="1.0" encoding="utf-8"?>
+<p:sldLayout xmlns:a="http://schemas.openxmlformats.org/drawingml/2006/main" xmlns:p="http://schemas.openxmlformats.org/presentationml/2006/main" xmlns:r="http://schemas.openxmlformats.org/officeDocument/2006/relationships" xmlns:p14="http://schemas.microsoft.com/office/powerpoint/2010/main" xmlns:p15="http://schemas.microsoft.com/office/powerpoint/2012/main" xmlns:mc="http://schemas.openxmlformats.org/markup-compatibility/2006" type="obj" preserve="1">
+  <p:cSld name="Title, Content">
+    <p:spTree>
+      <p:nvGrpSpPr>
+        <p:cNvPr id="1" name=""/>
+        <p:cNvGrpSpPr/>
+        <p:nvPr/>
+      </p:nvGrpSpPr>
+      <p:grpSpPr>
+        <a:xfrm>
+          <a:off x="0" y="0"/>
+          <a:ext cx="0" cy="0"/>
+          <a:chOff x="0" y="0"/>
+          <a:chExt cx="0" cy="0"/>
+        </a:xfrm>
+      </p:grpSpPr>
+      <p:sp>
+        <p:nvSpPr>
+          <p:cNvPr id="86" name="PlaceHolder 1"/>
+          <p:cNvSpPr>
+            <a:spLocks noGrp="1"/>
+          </p:cNvSpPr>
+          <p:nvPr>
+            <p:ph type="title"/>
+          </p:nvPr>
+        </p:nvSpPr>
+        <p:spPr>
+          <a:xfrm>
+            <a:off x="504000" y="210600"/>
+            <a:ext cx="7018200" cy="946800"/>
+          </a:xfrm>
+          <a:prstGeom prst="rect">
+            <a:avLst/>
+          </a:prstGeom>
+        </p:spPr>
+        <p:txBody>
+          <a:bodyPr lIns="0" rIns="0" tIns="0" bIns="0" anchor="ctr">
+            <a:spAutoFit/>
+          </a:bodyPr>
+          <a:p>
+            <a:pPr algn="ctr"/>
+            <a:endParaRPr b="0" lang="en-US" sz="4400" spc="-1" strike="noStrike">
+              <a:latin typeface="Arial"/>
+            </a:endParaRPr>
+          </a:p>
+        </p:txBody>
+      </p:sp>
+      <p:sp>
+        <p:nvSpPr>
+          <p:cNvPr id="87" name="PlaceHolder 2"/>
+          <p:cNvSpPr>
+            <a:spLocks noGrp="1"/>
+          </p:cNvSpPr>
+          <p:nvPr>
+            <p:ph type="body"/>
+          </p:nvPr>
+        </p:nvSpPr>
+        <p:spPr>
+          <a:xfrm>
+            <a:off x="504000" y="1326600"/>
+            <a:ext cx="513360" cy="3287160"/>
+          </a:xfrm>
+          <a:prstGeom prst="rect">
+            <a:avLst/>
+          </a:prstGeom>
+        </p:spPr>
+        <p:txBody>
+          <a:bodyPr lIns="0" rIns="0" tIns="0" bIns="0">
+            <a:normAutofit fontScale="27000"/>
+          </a:bodyPr>
+          <a:p>
+            <a:endParaRPr b="0" lang="en-US" sz="3200" spc="-1" strike="noStrike">
+              <a:latin typeface="Arial"/>
+            </a:endParaRPr>
+          </a:p>
+        </p:txBody>
+      </p:sp>
+    </p:spTree>
+  </p:cSld>
+</p:sldLayout>
+</file>
+
+<file path=ppt/slideLayouts/slideLayout28.xml><?xml version="1.0" encoding="utf-8"?>
+<p:sldLayout xmlns:a="http://schemas.openxmlformats.org/drawingml/2006/main" xmlns:p="http://schemas.openxmlformats.org/presentationml/2006/main" xmlns:r="http://schemas.openxmlformats.org/officeDocument/2006/relationships" xmlns:p14="http://schemas.microsoft.com/office/powerpoint/2010/main" xmlns:p15="http://schemas.microsoft.com/office/powerpoint/2012/main" xmlns:mc="http://schemas.openxmlformats.org/markup-compatibility/2006" type="twoObj" preserve="1">
+  <p:cSld name="Title, 2 Content">
+    <p:spTree>
+      <p:nvGrpSpPr>
+        <p:cNvPr id="1" name=""/>
+        <p:cNvGrpSpPr/>
+        <p:nvPr/>
+      </p:nvGrpSpPr>
+      <p:grpSpPr>
+        <a:xfrm>
+          <a:off x="0" y="0"/>
+          <a:ext cx="0" cy="0"/>
+          <a:chOff x="0" y="0"/>
+          <a:chExt cx="0" cy="0"/>
+        </a:xfrm>
+      </p:grpSpPr>
+      <p:sp>
+        <p:nvSpPr>
+          <p:cNvPr id="88" name="PlaceHolder 1"/>
+          <p:cNvSpPr>
+            <a:spLocks noGrp="1"/>
+          </p:cNvSpPr>
+          <p:nvPr>
+            <p:ph type="title"/>
+          </p:nvPr>
+        </p:nvSpPr>
+        <p:spPr>
+          <a:xfrm>
+            <a:off x="504000" y="210600"/>
+            <a:ext cx="7018200" cy="946800"/>
+          </a:xfrm>
+          <a:prstGeom prst="rect">
+            <a:avLst/>
+          </a:prstGeom>
+        </p:spPr>
+        <p:txBody>
+          <a:bodyPr lIns="0" rIns="0" tIns="0" bIns="0" anchor="ctr">
+            <a:spAutoFit/>
+          </a:bodyPr>
+          <a:p>
+            <a:pPr algn="ctr"/>
+            <a:endParaRPr b="0" lang="en-US" sz="4400" spc="-1" strike="noStrike">
+              <a:latin typeface="Arial"/>
+            </a:endParaRPr>
+          </a:p>
+        </p:txBody>
+      </p:sp>
+      <p:sp>
+        <p:nvSpPr>
+          <p:cNvPr id="89" name="PlaceHolder 2"/>
+          <p:cNvSpPr>
+            <a:spLocks noGrp="1"/>
+          </p:cNvSpPr>
+          <p:nvPr>
+            <p:ph type="body"/>
+          </p:nvPr>
+        </p:nvSpPr>
+        <p:spPr>
+          <a:xfrm>
+            <a:off x="504000" y="1326600"/>
+            <a:ext cx="250200" cy="3287160"/>
+          </a:xfrm>
+          <a:prstGeom prst="rect">
+            <a:avLst/>
+          </a:prstGeom>
+        </p:spPr>
+        <p:txBody>
+          <a:bodyPr lIns="0" rIns="0" tIns="0" bIns="0">
+            <a:normAutofit fontScale="27000"/>
+          </a:bodyPr>
+          <a:p>
+            <a:endParaRPr b="0" lang="en-US" sz="3200" spc="-1" strike="noStrike">
+              <a:latin typeface="Arial"/>
+            </a:endParaRPr>
+          </a:p>
+        </p:txBody>
+      </p:sp>
+      <p:sp>
+        <p:nvSpPr>
+          <p:cNvPr id="90" name="PlaceHolder 3"/>
+          <p:cNvSpPr>
+            <a:spLocks noGrp="1"/>
+          </p:cNvSpPr>
+          <p:nvPr>
+            <p:ph type="body"/>
+          </p:nvPr>
+        </p:nvSpPr>
+        <p:spPr>
+          <a:xfrm>
+            <a:off x="767160" y="1326600"/>
+            <a:ext cx="250200" cy="3287160"/>
+          </a:xfrm>
+          <a:prstGeom prst="rect">
+            <a:avLst/>
+          </a:prstGeom>
+        </p:spPr>
+        <p:txBody>
+          <a:bodyPr lIns="0" rIns="0" tIns="0" bIns="0">
+            <a:normAutofit fontScale="27000"/>
+          </a:bodyPr>
+          <a:p>
+            <a:endParaRPr b="0" lang="en-US" sz="3200" spc="-1" strike="noStrike">
+              <a:latin typeface="Arial"/>
+            </a:endParaRPr>
+          </a:p>
+        </p:txBody>
+      </p:sp>
+    </p:spTree>
+  </p:cSld>
+</p:sldLayout>
+</file>
+
+<file path=ppt/slideLayouts/slideLayout29.xml><?xml version="1.0" encoding="utf-8"?>
+<p:sldLayout xmlns:a="http://schemas.openxmlformats.org/drawingml/2006/main" xmlns:p="http://schemas.openxmlformats.org/presentationml/2006/main" xmlns:r="http://schemas.openxmlformats.org/officeDocument/2006/relationships" xmlns:p14="http://schemas.microsoft.com/office/powerpoint/2010/main" xmlns:p15="http://schemas.microsoft.com/office/powerpoint/2012/main" xmlns:mc="http://schemas.openxmlformats.org/markup-compatibility/2006" type="titleOnly" preserve="1">
+  <p:cSld name="Title Only">
+    <p:spTree>
+      <p:nvGrpSpPr>
+        <p:cNvPr id="1" name=""/>
+        <p:cNvGrpSpPr/>
+        <p:nvPr/>
+      </p:nvGrpSpPr>
+      <p:grpSpPr>
+        <a:xfrm>
+          <a:off x="0" y="0"/>
+          <a:ext cx="0" cy="0"/>
+          <a:chOff x="0" y="0"/>
+          <a:chExt cx="0" cy="0"/>
+        </a:xfrm>
+      </p:grpSpPr>
+      <p:sp>
+        <p:nvSpPr>
+          <p:cNvPr id="91" name="PlaceHolder 1"/>
+          <p:cNvSpPr>
+            <a:spLocks noGrp="1"/>
+          </p:cNvSpPr>
+          <p:nvPr>
+            <p:ph type="title"/>
+          </p:nvPr>
+        </p:nvSpPr>
+        <p:spPr>
+          <a:xfrm>
+            <a:off x="504000" y="210600"/>
+            <a:ext cx="7018200" cy="946800"/>
+          </a:xfrm>
+          <a:prstGeom prst="rect">
+            <a:avLst/>
+          </a:prstGeom>
+        </p:spPr>
+        <p:txBody>
+          <a:bodyPr lIns="0" rIns="0" tIns="0" bIns="0" anchor="ctr">
+            <a:spAutoFit/>
+          </a:bodyPr>
+          <a:p>
+            <a:pPr algn="ctr"/>
+            <a:endParaRPr b="0" lang="en-US" sz="4400" spc="-1" strike="noStrike">
               <a:latin typeface="Arial"/>
             </a:endParaRPr>
           </a:p>
@@ -2026,7 +2382,7 @@
         <p:spPr>
           <a:xfrm>
             <a:off x="504000" y="210600"/>
-            <a:ext cx="7018560" cy="946800"/>
+            <a:ext cx="7018200" cy="946800"/>
           </a:xfrm>
           <a:prstGeom prst="rect">
             <a:avLst/>
@@ -2057,15 +2413,1016 @@
         <p:spPr>
           <a:xfrm>
             <a:off x="504000" y="1326600"/>
-            <a:ext cx="1053360" cy="3287520"/>
-          </a:xfrm>
-          <a:prstGeom prst="rect">
-            <a:avLst/>
-          </a:prstGeom>
-        </p:spPr>
-        <p:txBody>
-          <a:bodyPr lIns="0" rIns="0" tIns="0" bIns="0">
-            <a:normAutofit/>
+            <a:ext cx="513360" cy="3287160"/>
+          </a:xfrm>
+          <a:prstGeom prst="rect">
+            <a:avLst/>
+          </a:prstGeom>
+        </p:spPr>
+        <p:txBody>
+          <a:bodyPr lIns="0" rIns="0" tIns="0" bIns="0">
+            <a:normAutofit fontScale="27000"/>
+          </a:bodyPr>
+          <a:p>
+            <a:endParaRPr b="0" lang="en-US" sz="3200" spc="-1" strike="noStrike">
+              <a:latin typeface="Arial"/>
+            </a:endParaRPr>
+          </a:p>
+        </p:txBody>
+      </p:sp>
+    </p:spTree>
+  </p:cSld>
+</p:sldLayout>
+</file>
+
+<file path=ppt/slideLayouts/slideLayout30.xml><?xml version="1.0" encoding="utf-8"?>
+<p:sldLayout xmlns:a="http://schemas.openxmlformats.org/drawingml/2006/main" xmlns:p="http://schemas.openxmlformats.org/presentationml/2006/main" xmlns:r="http://schemas.openxmlformats.org/officeDocument/2006/relationships" xmlns:p14="http://schemas.microsoft.com/office/powerpoint/2010/main" xmlns:p15="http://schemas.microsoft.com/office/powerpoint/2012/main" xmlns:mc="http://schemas.openxmlformats.org/markup-compatibility/2006" type="objOnly" preserve="1">
+  <p:cSld name="Centered Text">
+    <p:spTree>
+      <p:nvGrpSpPr>
+        <p:cNvPr id="1" name=""/>
+        <p:cNvGrpSpPr/>
+        <p:nvPr/>
+      </p:nvGrpSpPr>
+      <p:grpSpPr>
+        <a:xfrm>
+          <a:off x="0" y="0"/>
+          <a:ext cx="0" cy="0"/>
+          <a:chOff x="0" y="0"/>
+          <a:chExt cx="0" cy="0"/>
+        </a:xfrm>
+      </p:grpSpPr>
+      <p:sp>
+        <p:nvSpPr>
+          <p:cNvPr id="92" name="PlaceHolder 1"/>
+          <p:cNvSpPr>
+            <a:spLocks noGrp="1"/>
+          </p:cNvSpPr>
+          <p:nvPr>
+            <p:ph type="subTitle"/>
+          </p:nvPr>
+        </p:nvSpPr>
+        <p:spPr>
+          <a:xfrm>
+            <a:off x="504000" y="210600"/>
+            <a:ext cx="7018200" cy="4390200"/>
+          </a:xfrm>
+          <a:prstGeom prst="rect">
+            <a:avLst/>
+          </a:prstGeom>
+        </p:spPr>
+        <p:txBody>
+          <a:bodyPr lIns="0" rIns="0" tIns="0" bIns="0" anchor="ctr">
+            <a:spAutoFit/>
+          </a:bodyPr>
+          <a:p>
+            <a:pPr algn="ctr"/>
+            <a:endParaRPr b="0" lang="en-US" sz="3200" spc="-1" strike="noStrike">
+              <a:latin typeface="Arial"/>
+            </a:endParaRPr>
+          </a:p>
+        </p:txBody>
+      </p:sp>
+    </p:spTree>
+  </p:cSld>
+</p:sldLayout>
+</file>
+
+<file path=ppt/slideLayouts/slideLayout31.xml><?xml version="1.0" encoding="utf-8"?>
+<p:sldLayout xmlns:a="http://schemas.openxmlformats.org/drawingml/2006/main" xmlns:p="http://schemas.openxmlformats.org/presentationml/2006/main" xmlns:r="http://schemas.openxmlformats.org/officeDocument/2006/relationships" xmlns:p14="http://schemas.microsoft.com/office/powerpoint/2010/main" xmlns:p15="http://schemas.microsoft.com/office/powerpoint/2012/main" xmlns:mc="http://schemas.openxmlformats.org/markup-compatibility/2006" type="twoObjAndObj" preserve="1">
+  <p:cSld name="Title, 2 Content and Content">
+    <p:spTree>
+      <p:nvGrpSpPr>
+        <p:cNvPr id="1" name=""/>
+        <p:cNvGrpSpPr/>
+        <p:nvPr/>
+      </p:nvGrpSpPr>
+      <p:grpSpPr>
+        <a:xfrm>
+          <a:off x="0" y="0"/>
+          <a:ext cx="0" cy="0"/>
+          <a:chOff x="0" y="0"/>
+          <a:chExt cx="0" cy="0"/>
+        </a:xfrm>
+      </p:grpSpPr>
+      <p:sp>
+        <p:nvSpPr>
+          <p:cNvPr id="93" name="PlaceHolder 1"/>
+          <p:cNvSpPr>
+            <a:spLocks noGrp="1"/>
+          </p:cNvSpPr>
+          <p:nvPr>
+            <p:ph type="title"/>
+          </p:nvPr>
+        </p:nvSpPr>
+        <p:spPr>
+          <a:xfrm>
+            <a:off x="504000" y="210600"/>
+            <a:ext cx="7018200" cy="946800"/>
+          </a:xfrm>
+          <a:prstGeom prst="rect">
+            <a:avLst/>
+          </a:prstGeom>
+        </p:spPr>
+        <p:txBody>
+          <a:bodyPr lIns="0" rIns="0" tIns="0" bIns="0" anchor="ctr">
+            <a:spAutoFit/>
+          </a:bodyPr>
+          <a:p>
+            <a:pPr algn="ctr"/>
+            <a:endParaRPr b="0" lang="en-US" sz="4400" spc="-1" strike="noStrike">
+              <a:latin typeface="Arial"/>
+            </a:endParaRPr>
+          </a:p>
+        </p:txBody>
+      </p:sp>
+      <p:sp>
+        <p:nvSpPr>
+          <p:cNvPr id="94" name="PlaceHolder 2"/>
+          <p:cNvSpPr>
+            <a:spLocks noGrp="1"/>
+          </p:cNvSpPr>
+          <p:nvPr>
+            <p:ph type="body"/>
+          </p:nvPr>
+        </p:nvSpPr>
+        <p:spPr>
+          <a:xfrm>
+            <a:off x="504000" y="1326600"/>
+            <a:ext cx="250200" cy="1567800"/>
+          </a:xfrm>
+          <a:prstGeom prst="rect">
+            <a:avLst/>
+          </a:prstGeom>
+        </p:spPr>
+        <p:txBody>
+          <a:bodyPr lIns="0" rIns="0" tIns="0" bIns="0">
+            <a:normAutofit fontScale="9000"/>
+          </a:bodyPr>
+          <a:p>
+            <a:endParaRPr b="0" lang="en-US" sz="3200" spc="-1" strike="noStrike">
+              <a:latin typeface="Arial"/>
+            </a:endParaRPr>
+          </a:p>
+        </p:txBody>
+      </p:sp>
+      <p:sp>
+        <p:nvSpPr>
+          <p:cNvPr id="95" name="PlaceHolder 3"/>
+          <p:cNvSpPr>
+            <a:spLocks noGrp="1"/>
+          </p:cNvSpPr>
+          <p:nvPr>
+            <p:ph type="body"/>
+          </p:nvPr>
+        </p:nvSpPr>
+        <p:spPr>
+          <a:xfrm>
+            <a:off x="767160" y="1326600"/>
+            <a:ext cx="250200" cy="3287160"/>
+          </a:xfrm>
+          <a:prstGeom prst="rect">
+            <a:avLst/>
+          </a:prstGeom>
+        </p:spPr>
+        <p:txBody>
+          <a:bodyPr lIns="0" rIns="0" tIns="0" bIns="0">
+            <a:normAutofit fontScale="27000"/>
+          </a:bodyPr>
+          <a:p>
+            <a:endParaRPr b="0" lang="en-US" sz="3200" spc="-1" strike="noStrike">
+              <a:latin typeface="Arial"/>
+            </a:endParaRPr>
+          </a:p>
+        </p:txBody>
+      </p:sp>
+      <p:sp>
+        <p:nvSpPr>
+          <p:cNvPr id="96" name="PlaceHolder 4"/>
+          <p:cNvSpPr>
+            <a:spLocks noGrp="1"/>
+          </p:cNvSpPr>
+          <p:nvPr>
+            <p:ph type="body"/>
+          </p:nvPr>
+        </p:nvSpPr>
+        <p:spPr>
+          <a:xfrm>
+            <a:off x="504000" y="3043800"/>
+            <a:ext cx="250200" cy="1567800"/>
+          </a:xfrm>
+          <a:prstGeom prst="rect">
+            <a:avLst/>
+          </a:prstGeom>
+        </p:spPr>
+        <p:txBody>
+          <a:bodyPr lIns="0" rIns="0" tIns="0" bIns="0">
+            <a:normAutofit fontScale="9000"/>
+          </a:bodyPr>
+          <a:p>
+            <a:endParaRPr b="0" lang="en-US" sz="3200" spc="-1" strike="noStrike">
+              <a:latin typeface="Arial"/>
+            </a:endParaRPr>
+          </a:p>
+        </p:txBody>
+      </p:sp>
+    </p:spTree>
+  </p:cSld>
+</p:sldLayout>
+</file>
+
+<file path=ppt/slideLayouts/slideLayout32.xml><?xml version="1.0" encoding="utf-8"?>
+<p:sldLayout xmlns:a="http://schemas.openxmlformats.org/drawingml/2006/main" xmlns:p="http://schemas.openxmlformats.org/presentationml/2006/main" xmlns:r="http://schemas.openxmlformats.org/officeDocument/2006/relationships" xmlns:p14="http://schemas.microsoft.com/office/powerpoint/2010/main" xmlns:p15="http://schemas.microsoft.com/office/powerpoint/2012/main" xmlns:mc="http://schemas.openxmlformats.org/markup-compatibility/2006" type="objAndTwoObj" preserve="1">
+  <p:cSld name="Title Content and 2 Content">
+    <p:spTree>
+      <p:nvGrpSpPr>
+        <p:cNvPr id="1" name=""/>
+        <p:cNvGrpSpPr/>
+        <p:nvPr/>
+      </p:nvGrpSpPr>
+      <p:grpSpPr>
+        <a:xfrm>
+          <a:off x="0" y="0"/>
+          <a:ext cx="0" cy="0"/>
+          <a:chOff x="0" y="0"/>
+          <a:chExt cx="0" cy="0"/>
+        </a:xfrm>
+      </p:grpSpPr>
+      <p:sp>
+        <p:nvSpPr>
+          <p:cNvPr id="97" name="PlaceHolder 1"/>
+          <p:cNvSpPr>
+            <a:spLocks noGrp="1"/>
+          </p:cNvSpPr>
+          <p:nvPr>
+            <p:ph type="title"/>
+          </p:nvPr>
+        </p:nvSpPr>
+        <p:spPr>
+          <a:xfrm>
+            <a:off x="504000" y="210600"/>
+            <a:ext cx="7018200" cy="946800"/>
+          </a:xfrm>
+          <a:prstGeom prst="rect">
+            <a:avLst/>
+          </a:prstGeom>
+        </p:spPr>
+        <p:txBody>
+          <a:bodyPr lIns="0" rIns="0" tIns="0" bIns="0" anchor="ctr">
+            <a:spAutoFit/>
+          </a:bodyPr>
+          <a:p>
+            <a:pPr algn="ctr"/>
+            <a:endParaRPr b="0" lang="en-US" sz="4400" spc="-1" strike="noStrike">
+              <a:latin typeface="Arial"/>
+            </a:endParaRPr>
+          </a:p>
+        </p:txBody>
+      </p:sp>
+      <p:sp>
+        <p:nvSpPr>
+          <p:cNvPr id="98" name="PlaceHolder 2"/>
+          <p:cNvSpPr>
+            <a:spLocks noGrp="1"/>
+          </p:cNvSpPr>
+          <p:nvPr>
+            <p:ph type="body"/>
+          </p:nvPr>
+        </p:nvSpPr>
+        <p:spPr>
+          <a:xfrm>
+            <a:off x="504000" y="1326600"/>
+            <a:ext cx="250200" cy="3287160"/>
+          </a:xfrm>
+          <a:prstGeom prst="rect">
+            <a:avLst/>
+          </a:prstGeom>
+        </p:spPr>
+        <p:txBody>
+          <a:bodyPr lIns="0" rIns="0" tIns="0" bIns="0">
+            <a:normAutofit fontScale="27000"/>
+          </a:bodyPr>
+          <a:p>
+            <a:endParaRPr b="0" lang="en-US" sz="3200" spc="-1" strike="noStrike">
+              <a:latin typeface="Arial"/>
+            </a:endParaRPr>
+          </a:p>
+        </p:txBody>
+      </p:sp>
+      <p:sp>
+        <p:nvSpPr>
+          <p:cNvPr id="99" name="PlaceHolder 3"/>
+          <p:cNvSpPr>
+            <a:spLocks noGrp="1"/>
+          </p:cNvSpPr>
+          <p:nvPr>
+            <p:ph type="body"/>
+          </p:nvPr>
+        </p:nvSpPr>
+        <p:spPr>
+          <a:xfrm>
+            <a:off x="767160" y="1326600"/>
+            <a:ext cx="250200" cy="1567800"/>
+          </a:xfrm>
+          <a:prstGeom prst="rect">
+            <a:avLst/>
+          </a:prstGeom>
+        </p:spPr>
+        <p:txBody>
+          <a:bodyPr lIns="0" rIns="0" tIns="0" bIns="0">
+            <a:normAutofit fontScale="9000"/>
+          </a:bodyPr>
+          <a:p>
+            <a:endParaRPr b="0" lang="en-US" sz="3200" spc="-1" strike="noStrike">
+              <a:latin typeface="Arial"/>
+            </a:endParaRPr>
+          </a:p>
+        </p:txBody>
+      </p:sp>
+      <p:sp>
+        <p:nvSpPr>
+          <p:cNvPr id="100" name="PlaceHolder 4"/>
+          <p:cNvSpPr>
+            <a:spLocks noGrp="1"/>
+          </p:cNvSpPr>
+          <p:nvPr>
+            <p:ph type="body"/>
+          </p:nvPr>
+        </p:nvSpPr>
+        <p:spPr>
+          <a:xfrm>
+            <a:off x="767160" y="3043800"/>
+            <a:ext cx="250200" cy="1567800"/>
+          </a:xfrm>
+          <a:prstGeom prst="rect">
+            <a:avLst/>
+          </a:prstGeom>
+        </p:spPr>
+        <p:txBody>
+          <a:bodyPr lIns="0" rIns="0" tIns="0" bIns="0">
+            <a:normAutofit fontScale="9000"/>
+          </a:bodyPr>
+          <a:p>
+            <a:endParaRPr b="0" lang="en-US" sz="3200" spc="-1" strike="noStrike">
+              <a:latin typeface="Arial"/>
+            </a:endParaRPr>
+          </a:p>
+        </p:txBody>
+      </p:sp>
+    </p:spTree>
+  </p:cSld>
+</p:sldLayout>
+</file>
+
+<file path=ppt/slideLayouts/slideLayout33.xml><?xml version="1.0" encoding="utf-8"?>
+<p:sldLayout xmlns:a="http://schemas.openxmlformats.org/drawingml/2006/main" xmlns:p="http://schemas.openxmlformats.org/presentationml/2006/main" xmlns:r="http://schemas.openxmlformats.org/officeDocument/2006/relationships" xmlns:p14="http://schemas.microsoft.com/office/powerpoint/2010/main" xmlns:p15="http://schemas.microsoft.com/office/powerpoint/2012/main" xmlns:mc="http://schemas.openxmlformats.org/markup-compatibility/2006" type="twoObjOverTx" preserve="1">
+  <p:cSld name="Title, 2 Content over Content">
+    <p:spTree>
+      <p:nvGrpSpPr>
+        <p:cNvPr id="1" name=""/>
+        <p:cNvGrpSpPr/>
+        <p:nvPr/>
+      </p:nvGrpSpPr>
+      <p:grpSpPr>
+        <a:xfrm>
+          <a:off x="0" y="0"/>
+          <a:ext cx="0" cy="0"/>
+          <a:chOff x="0" y="0"/>
+          <a:chExt cx="0" cy="0"/>
+        </a:xfrm>
+      </p:grpSpPr>
+      <p:sp>
+        <p:nvSpPr>
+          <p:cNvPr id="101" name="PlaceHolder 1"/>
+          <p:cNvSpPr>
+            <a:spLocks noGrp="1"/>
+          </p:cNvSpPr>
+          <p:nvPr>
+            <p:ph type="title"/>
+          </p:nvPr>
+        </p:nvSpPr>
+        <p:spPr>
+          <a:xfrm>
+            <a:off x="504000" y="210600"/>
+            <a:ext cx="7018200" cy="946800"/>
+          </a:xfrm>
+          <a:prstGeom prst="rect">
+            <a:avLst/>
+          </a:prstGeom>
+        </p:spPr>
+        <p:txBody>
+          <a:bodyPr lIns="0" rIns="0" tIns="0" bIns="0" anchor="ctr">
+            <a:spAutoFit/>
+          </a:bodyPr>
+          <a:p>
+            <a:pPr algn="ctr"/>
+            <a:endParaRPr b="0" lang="en-US" sz="4400" spc="-1" strike="noStrike">
+              <a:latin typeface="Arial"/>
+            </a:endParaRPr>
+          </a:p>
+        </p:txBody>
+      </p:sp>
+      <p:sp>
+        <p:nvSpPr>
+          <p:cNvPr id="102" name="PlaceHolder 2"/>
+          <p:cNvSpPr>
+            <a:spLocks noGrp="1"/>
+          </p:cNvSpPr>
+          <p:nvPr>
+            <p:ph type="body"/>
+          </p:nvPr>
+        </p:nvSpPr>
+        <p:spPr>
+          <a:xfrm>
+            <a:off x="504000" y="1326600"/>
+            <a:ext cx="250200" cy="1567800"/>
+          </a:xfrm>
+          <a:prstGeom prst="rect">
+            <a:avLst/>
+          </a:prstGeom>
+        </p:spPr>
+        <p:txBody>
+          <a:bodyPr lIns="0" rIns="0" tIns="0" bIns="0">
+            <a:normAutofit fontScale="9000"/>
+          </a:bodyPr>
+          <a:p>
+            <a:endParaRPr b="0" lang="en-US" sz="3200" spc="-1" strike="noStrike">
+              <a:latin typeface="Arial"/>
+            </a:endParaRPr>
+          </a:p>
+        </p:txBody>
+      </p:sp>
+      <p:sp>
+        <p:nvSpPr>
+          <p:cNvPr id="103" name="PlaceHolder 3"/>
+          <p:cNvSpPr>
+            <a:spLocks noGrp="1"/>
+          </p:cNvSpPr>
+          <p:nvPr>
+            <p:ph type="body"/>
+          </p:nvPr>
+        </p:nvSpPr>
+        <p:spPr>
+          <a:xfrm>
+            <a:off x="767160" y="1326600"/>
+            <a:ext cx="250200" cy="1567800"/>
+          </a:xfrm>
+          <a:prstGeom prst="rect">
+            <a:avLst/>
+          </a:prstGeom>
+        </p:spPr>
+        <p:txBody>
+          <a:bodyPr lIns="0" rIns="0" tIns="0" bIns="0">
+            <a:normAutofit fontScale="9000"/>
+          </a:bodyPr>
+          <a:p>
+            <a:endParaRPr b="0" lang="en-US" sz="3200" spc="-1" strike="noStrike">
+              <a:latin typeface="Arial"/>
+            </a:endParaRPr>
+          </a:p>
+        </p:txBody>
+      </p:sp>
+      <p:sp>
+        <p:nvSpPr>
+          <p:cNvPr id="104" name="PlaceHolder 4"/>
+          <p:cNvSpPr>
+            <a:spLocks noGrp="1"/>
+          </p:cNvSpPr>
+          <p:nvPr>
+            <p:ph type="body"/>
+          </p:nvPr>
+        </p:nvSpPr>
+        <p:spPr>
+          <a:xfrm>
+            <a:off x="504000" y="3043800"/>
+            <a:ext cx="513360" cy="1567800"/>
+          </a:xfrm>
+          <a:prstGeom prst="rect">
+            <a:avLst/>
+          </a:prstGeom>
+        </p:spPr>
+        <p:txBody>
+          <a:bodyPr lIns="0" rIns="0" tIns="0" bIns="0">
+            <a:normAutofit fontScale="9000"/>
+          </a:bodyPr>
+          <a:p>
+            <a:endParaRPr b="0" lang="en-US" sz="3200" spc="-1" strike="noStrike">
+              <a:latin typeface="Arial"/>
+            </a:endParaRPr>
+          </a:p>
+        </p:txBody>
+      </p:sp>
+    </p:spTree>
+  </p:cSld>
+</p:sldLayout>
+</file>
+
+<file path=ppt/slideLayouts/slideLayout34.xml><?xml version="1.0" encoding="utf-8"?>
+<p:sldLayout xmlns:a="http://schemas.openxmlformats.org/drawingml/2006/main" xmlns:p="http://schemas.openxmlformats.org/presentationml/2006/main" xmlns:r="http://schemas.openxmlformats.org/officeDocument/2006/relationships" xmlns:p14="http://schemas.microsoft.com/office/powerpoint/2010/main" xmlns:p15="http://schemas.microsoft.com/office/powerpoint/2012/main" xmlns:mc="http://schemas.openxmlformats.org/markup-compatibility/2006" type="objOverTx" preserve="1">
+  <p:cSld name="Title, Content over Content">
+    <p:spTree>
+      <p:nvGrpSpPr>
+        <p:cNvPr id="1" name=""/>
+        <p:cNvGrpSpPr/>
+        <p:nvPr/>
+      </p:nvGrpSpPr>
+      <p:grpSpPr>
+        <a:xfrm>
+          <a:off x="0" y="0"/>
+          <a:ext cx="0" cy="0"/>
+          <a:chOff x="0" y="0"/>
+          <a:chExt cx="0" cy="0"/>
+        </a:xfrm>
+      </p:grpSpPr>
+      <p:sp>
+        <p:nvSpPr>
+          <p:cNvPr id="105" name="PlaceHolder 1"/>
+          <p:cNvSpPr>
+            <a:spLocks noGrp="1"/>
+          </p:cNvSpPr>
+          <p:nvPr>
+            <p:ph type="title"/>
+          </p:nvPr>
+        </p:nvSpPr>
+        <p:spPr>
+          <a:xfrm>
+            <a:off x="504000" y="210600"/>
+            <a:ext cx="7018200" cy="946800"/>
+          </a:xfrm>
+          <a:prstGeom prst="rect">
+            <a:avLst/>
+          </a:prstGeom>
+        </p:spPr>
+        <p:txBody>
+          <a:bodyPr lIns="0" rIns="0" tIns="0" bIns="0" anchor="ctr">
+            <a:spAutoFit/>
+          </a:bodyPr>
+          <a:p>
+            <a:pPr algn="ctr"/>
+            <a:endParaRPr b="0" lang="en-US" sz="4400" spc="-1" strike="noStrike">
+              <a:latin typeface="Arial"/>
+            </a:endParaRPr>
+          </a:p>
+        </p:txBody>
+      </p:sp>
+      <p:sp>
+        <p:nvSpPr>
+          <p:cNvPr id="106" name="PlaceHolder 2"/>
+          <p:cNvSpPr>
+            <a:spLocks noGrp="1"/>
+          </p:cNvSpPr>
+          <p:nvPr>
+            <p:ph type="body"/>
+          </p:nvPr>
+        </p:nvSpPr>
+        <p:spPr>
+          <a:xfrm>
+            <a:off x="504000" y="1326600"/>
+            <a:ext cx="513360" cy="1567800"/>
+          </a:xfrm>
+          <a:prstGeom prst="rect">
+            <a:avLst/>
+          </a:prstGeom>
+        </p:spPr>
+        <p:txBody>
+          <a:bodyPr lIns="0" rIns="0" tIns="0" bIns="0">
+            <a:normAutofit fontScale="9000"/>
+          </a:bodyPr>
+          <a:p>
+            <a:endParaRPr b="0" lang="en-US" sz="3200" spc="-1" strike="noStrike">
+              <a:latin typeface="Arial"/>
+            </a:endParaRPr>
+          </a:p>
+        </p:txBody>
+      </p:sp>
+      <p:sp>
+        <p:nvSpPr>
+          <p:cNvPr id="107" name="PlaceHolder 3"/>
+          <p:cNvSpPr>
+            <a:spLocks noGrp="1"/>
+          </p:cNvSpPr>
+          <p:nvPr>
+            <p:ph type="body"/>
+          </p:nvPr>
+        </p:nvSpPr>
+        <p:spPr>
+          <a:xfrm>
+            <a:off x="504000" y="3043800"/>
+            <a:ext cx="513360" cy="1567800"/>
+          </a:xfrm>
+          <a:prstGeom prst="rect">
+            <a:avLst/>
+          </a:prstGeom>
+        </p:spPr>
+        <p:txBody>
+          <a:bodyPr lIns="0" rIns="0" tIns="0" bIns="0">
+            <a:normAutofit fontScale="9000"/>
+          </a:bodyPr>
+          <a:p>
+            <a:endParaRPr b="0" lang="en-US" sz="3200" spc="-1" strike="noStrike">
+              <a:latin typeface="Arial"/>
+            </a:endParaRPr>
+          </a:p>
+        </p:txBody>
+      </p:sp>
+    </p:spTree>
+  </p:cSld>
+</p:sldLayout>
+</file>
+
+<file path=ppt/slideLayouts/slideLayout35.xml><?xml version="1.0" encoding="utf-8"?>
+<p:sldLayout xmlns:a="http://schemas.openxmlformats.org/drawingml/2006/main" xmlns:p="http://schemas.openxmlformats.org/presentationml/2006/main" xmlns:r="http://schemas.openxmlformats.org/officeDocument/2006/relationships" xmlns:p14="http://schemas.microsoft.com/office/powerpoint/2010/main" xmlns:p15="http://schemas.microsoft.com/office/powerpoint/2012/main" xmlns:mc="http://schemas.openxmlformats.org/markup-compatibility/2006" type="fourObj" preserve="1">
+  <p:cSld name="Title, 4 Content">
+    <p:spTree>
+      <p:nvGrpSpPr>
+        <p:cNvPr id="1" name=""/>
+        <p:cNvGrpSpPr/>
+        <p:nvPr/>
+      </p:nvGrpSpPr>
+      <p:grpSpPr>
+        <a:xfrm>
+          <a:off x="0" y="0"/>
+          <a:ext cx="0" cy="0"/>
+          <a:chOff x="0" y="0"/>
+          <a:chExt cx="0" cy="0"/>
+        </a:xfrm>
+      </p:grpSpPr>
+      <p:sp>
+        <p:nvSpPr>
+          <p:cNvPr id="108" name="PlaceHolder 1"/>
+          <p:cNvSpPr>
+            <a:spLocks noGrp="1"/>
+          </p:cNvSpPr>
+          <p:nvPr>
+            <p:ph type="title"/>
+          </p:nvPr>
+        </p:nvSpPr>
+        <p:spPr>
+          <a:xfrm>
+            <a:off x="504000" y="210600"/>
+            <a:ext cx="7018200" cy="946800"/>
+          </a:xfrm>
+          <a:prstGeom prst="rect">
+            <a:avLst/>
+          </a:prstGeom>
+        </p:spPr>
+        <p:txBody>
+          <a:bodyPr lIns="0" rIns="0" tIns="0" bIns="0" anchor="ctr">
+            <a:spAutoFit/>
+          </a:bodyPr>
+          <a:p>
+            <a:pPr algn="ctr"/>
+            <a:endParaRPr b="0" lang="en-US" sz="4400" spc="-1" strike="noStrike">
+              <a:latin typeface="Arial"/>
+            </a:endParaRPr>
+          </a:p>
+        </p:txBody>
+      </p:sp>
+      <p:sp>
+        <p:nvSpPr>
+          <p:cNvPr id="109" name="PlaceHolder 2"/>
+          <p:cNvSpPr>
+            <a:spLocks noGrp="1"/>
+          </p:cNvSpPr>
+          <p:nvPr>
+            <p:ph type="body"/>
+          </p:nvPr>
+        </p:nvSpPr>
+        <p:spPr>
+          <a:xfrm>
+            <a:off x="504000" y="1326600"/>
+            <a:ext cx="250200" cy="1567800"/>
+          </a:xfrm>
+          <a:prstGeom prst="rect">
+            <a:avLst/>
+          </a:prstGeom>
+        </p:spPr>
+        <p:txBody>
+          <a:bodyPr lIns="0" rIns="0" tIns="0" bIns="0">
+            <a:normAutofit fontScale="9000"/>
+          </a:bodyPr>
+          <a:p>
+            <a:endParaRPr b="0" lang="en-US" sz="3200" spc="-1" strike="noStrike">
+              <a:latin typeface="Arial"/>
+            </a:endParaRPr>
+          </a:p>
+        </p:txBody>
+      </p:sp>
+      <p:sp>
+        <p:nvSpPr>
+          <p:cNvPr id="110" name="PlaceHolder 3"/>
+          <p:cNvSpPr>
+            <a:spLocks noGrp="1"/>
+          </p:cNvSpPr>
+          <p:nvPr>
+            <p:ph type="body"/>
+          </p:nvPr>
+        </p:nvSpPr>
+        <p:spPr>
+          <a:xfrm>
+            <a:off x="767160" y="1326600"/>
+            <a:ext cx="250200" cy="1567800"/>
+          </a:xfrm>
+          <a:prstGeom prst="rect">
+            <a:avLst/>
+          </a:prstGeom>
+        </p:spPr>
+        <p:txBody>
+          <a:bodyPr lIns="0" rIns="0" tIns="0" bIns="0">
+            <a:normAutofit fontScale="9000"/>
+          </a:bodyPr>
+          <a:p>
+            <a:endParaRPr b="0" lang="en-US" sz="3200" spc="-1" strike="noStrike">
+              <a:latin typeface="Arial"/>
+            </a:endParaRPr>
+          </a:p>
+        </p:txBody>
+      </p:sp>
+      <p:sp>
+        <p:nvSpPr>
+          <p:cNvPr id="111" name="PlaceHolder 4"/>
+          <p:cNvSpPr>
+            <a:spLocks noGrp="1"/>
+          </p:cNvSpPr>
+          <p:nvPr>
+            <p:ph type="body"/>
+          </p:nvPr>
+        </p:nvSpPr>
+        <p:spPr>
+          <a:xfrm>
+            <a:off x="504000" y="3043800"/>
+            <a:ext cx="250200" cy="1567800"/>
+          </a:xfrm>
+          <a:prstGeom prst="rect">
+            <a:avLst/>
+          </a:prstGeom>
+        </p:spPr>
+        <p:txBody>
+          <a:bodyPr lIns="0" rIns="0" tIns="0" bIns="0">
+            <a:normAutofit fontScale="9000"/>
+          </a:bodyPr>
+          <a:p>
+            <a:endParaRPr b="0" lang="en-US" sz="3200" spc="-1" strike="noStrike">
+              <a:latin typeface="Arial"/>
+            </a:endParaRPr>
+          </a:p>
+        </p:txBody>
+      </p:sp>
+      <p:sp>
+        <p:nvSpPr>
+          <p:cNvPr id="112" name="PlaceHolder 5"/>
+          <p:cNvSpPr>
+            <a:spLocks noGrp="1"/>
+          </p:cNvSpPr>
+          <p:nvPr>
+            <p:ph type="body"/>
+          </p:nvPr>
+        </p:nvSpPr>
+        <p:spPr>
+          <a:xfrm>
+            <a:off x="767160" y="3043800"/>
+            <a:ext cx="250200" cy="1567800"/>
+          </a:xfrm>
+          <a:prstGeom prst="rect">
+            <a:avLst/>
+          </a:prstGeom>
+        </p:spPr>
+        <p:txBody>
+          <a:bodyPr lIns="0" rIns="0" tIns="0" bIns="0">
+            <a:normAutofit fontScale="9000"/>
+          </a:bodyPr>
+          <a:p>
+            <a:endParaRPr b="0" lang="en-US" sz="3200" spc="-1" strike="noStrike">
+              <a:latin typeface="Arial"/>
+            </a:endParaRPr>
+          </a:p>
+        </p:txBody>
+      </p:sp>
+    </p:spTree>
+  </p:cSld>
+</p:sldLayout>
+</file>
+
+<file path=ppt/slideLayouts/slideLayout36.xml><?xml version="1.0" encoding="utf-8"?>
+<p:sldLayout xmlns:a="http://schemas.openxmlformats.org/drawingml/2006/main" xmlns:p="http://schemas.openxmlformats.org/presentationml/2006/main" xmlns:r="http://schemas.openxmlformats.org/officeDocument/2006/relationships" xmlns:p14="http://schemas.microsoft.com/office/powerpoint/2010/main" xmlns:p15="http://schemas.microsoft.com/office/powerpoint/2012/main" xmlns:mc="http://schemas.openxmlformats.org/markup-compatibility/2006" type="blank" preserve="1">
+  <p:cSld name="Title, 6 Content">
+    <p:spTree>
+      <p:nvGrpSpPr>
+        <p:cNvPr id="1" name=""/>
+        <p:cNvGrpSpPr/>
+        <p:nvPr/>
+      </p:nvGrpSpPr>
+      <p:grpSpPr>
+        <a:xfrm>
+          <a:off x="0" y="0"/>
+          <a:ext cx="0" cy="0"/>
+          <a:chOff x="0" y="0"/>
+          <a:chExt cx="0" cy="0"/>
+        </a:xfrm>
+      </p:grpSpPr>
+      <p:sp>
+        <p:nvSpPr>
+          <p:cNvPr id="113" name="PlaceHolder 1"/>
+          <p:cNvSpPr>
+            <a:spLocks noGrp="1"/>
+          </p:cNvSpPr>
+          <p:nvPr>
+            <p:ph type="title"/>
+          </p:nvPr>
+        </p:nvSpPr>
+        <p:spPr>
+          <a:xfrm>
+            <a:off x="504000" y="210600"/>
+            <a:ext cx="7018200" cy="946800"/>
+          </a:xfrm>
+          <a:prstGeom prst="rect">
+            <a:avLst/>
+          </a:prstGeom>
+        </p:spPr>
+        <p:txBody>
+          <a:bodyPr lIns="0" rIns="0" tIns="0" bIns="0" anchor="ctr">
+            <a:spAutoFit/>
+          </a:bodyPr>
+          <a:p>
+            <a:pPr algn="ctr"/>
+            <a:endParaRPr b="0" lang="en-US" sz="4400" spc="-1" strike="noStrike">
+              <a:latin typeface="Arial"/>
+            </a:endParaRPr>
+          </a:p>
+        </p:txBody>
+      </p:sp>
+      <p:sp>
+        <p:nvSpPr>
+          <p:cNvPr id="114" name="PlaceHolder 2"/>
+          <p:cNvSpPr>
+            <a:spLocks noGrp="1"/>
+          </p:cNvSpPr>
+          <p:nvPr>
+            <p:ph type="body"/>
+          </p:nvPr>
+        </p:nvSpPr>
+        <p:spPr>
+          <a:xfrm>
+            <a:off x="504000" y="1326600"/>
+            <a:ext cx="164880" cy="1567800"/>
+          </a:xfrm>
+          <a:prstGeom prst="rect">
+            <a:avLst/>
+          </a:prstGeom>
+        </p:spPr>
+        <p:txBody>
+          <a:bodyPr lIns="0" rIns="0" tIns="0" bIns="0">
+            <a:normAutofit fontScale="9000"/>
+          </a:bodyPr>
+          <a:p>
+            <a:endParaRPr b="0" lang="en-US" sz="3200" spc="-1" strike="noStrike">
+              <a:latin typeface="Arial"/>
+            </a:endParaRPr>
+          </a:p>
+        </p:txBody>
+      </p:sp>
+      <p:sp>
+        <p:nvSpPr>
+          <p:cNvPr id="115" name="PlaceHolder 3"/>
+          <p:cNvSpPr>
+            <a:spLocks noGrp="1"/>
+          </p:cNvSpPr>
+          <p:nvPr>
+            <p:ph type="body"/>
+          </p:nvPr>
+        </p:nvSpPr>
+        <p:spPr>
+          <a:xfrm>
+            <a:off x="677520" y="1326600"/>
+            <a:ext cx="164880" cy="1567800"/>
+          </a:xfrm>
+          <a:prstGeom prst="rect">
+            <a:avLst/>
+          </a:prstGeom>
+        </p:spPr>
+        <p:txBody>
+          <a:bodyPr lIns="0" rIns="0" tIns="0" bIns="0">
+            <a:normAutofit fontScale="9000"/>
+          </a:bodyPr>
+          <a:p>
+            <a:endParaRPr b="0" lang="en-US" sz="3200" spc="-1" strike="noStrike">
+              <a:latin typeface="Arial"/>
+            </a:endParaRPr>
+          </a:p>
+        </p:txBody>
+      </p:sp>
+      <p:sp>
+        <p:nvSpPr>
+          <p:cNvPr id="116" name="PlaceHolder 4"/>
+          <p:cNvSpPr>
+            <a:spLocks noGrp="1"/>
+          </p:cNvSpPr>
+          <p:nvPr>
+            <p:ph type="body"/>
+          </p:nvPr>
+        </p:nvSpPr>
+        <p:spPr>
+          <a:xfrm>
+            <a:off x="851040" y="1326600"/>
+            <a:ext cx="164880" cy="1567800"/>
+          </a:xfrm>
+          <a:prstGeom prst="rect">
+            <a:avLst/>
+          </a:prstGeom>
+        </p:spPr>
+        <p:txBody>
+          <a:bodyPr lIns="0" rIns="0" tIns="0" bIns="0">
+            <a:normAutofit fontScale="9000"/>
+          </a:bodyPr>
+          <a:p>
+            <a:endParaRPr b="0" lang="en-US" sz="3200" spc="-1" strike="noStrike">
+              <a:latin typeface="Arial"/>
+            </a:endParaRPr>
+          </a:p>
+        </p:txBody>
+      </p:sp>
+      <p:sp>
+        <p:nvSpPr>
+          <p:cNvPr id="117" name="PlaceHolder 5"/>
+          <p:cNvSpPr>
+            <a:spLocks noGrp="1"/>
+          </p:cNvSpPr>
+          <p:nvPr>
+            <p:ph type="body"/>
+          </p:nvPr>
+        </p:nvSpPr>
+        <p:spPr>
+          <a:xfrm>
+            <a:off x="504000" y="3043800"/>
+            <a:ext cx="164880" cy="1567800"/>
+          </a:xfrm>
+          <a:prstGeom prst="rect">
+            <a:avLst/>
+          </a:prstGeom>
+        </p:spPr>
+        <p:txBody>
+          <a:bodyPr lIns="0" rIns="0" tIns="0" bIns="0">
+            <a:normAutofit fontScale="9000"/>
+          </a:bodyPr>
+          <a:p>
+            <a:endParaRPr b="0" lang="en-US" sz="3200" spc="-1" strike="noStrike">
+              <a:latin typeface="Arial"/>
+            </a:endParaRPr>
+          </a:p>
+        </p:txBody>
+      </p:sp>
+      <p:sp>
+        <p:nvSpPr>
+          <p:cNvPr id="118" name="PlaceHolder 6"/>
+          <p:cNvSpPr>
+            <a:spLocks noGrp="1"/>
+          </p:cNvSpPr>
+          <p:nvPr>
+            <p:ph type="body"/>
+          </p:nvPr>
+        </p:nvSpPr>
+        <p:spPr>
+          <a:xfrm>
+            <a:off x="677520" y="3043800"/>
+            <a:ext cx="164880" cy="1567800"/>
+          </a:xfrm>
+          <a:prstGeom prst="rect">
+            <a:avLst/>
+          </a:prstGeom>
+        </p:spPr>
+        <p:txBody>
+          <a:bodyPr lIns="0" rIns="0" tIns="0" bIns="0">
+            <a:normAutofit fontScale="9000"/>
+          </a:bodyPr>
+          <a:p>
+            <a:endParaRPr b="0" lang="en-US" sz="3200" spc="-1" strike="noStrike">
+              <a:latin typeface="Arial"/>
+            </a:endParaRPr>
+          </a:p>
+        </p:txBody>
+      </p:sp>
+      <p:sp>
+        <p:nvSpPr>
+          <p:cNvPr id="119" name="PlaceHolder 7"/>
+          <p:cNvSpPr>
+            <a:spLocks noGrp="1"/>
+          </p:cNvSpPr>
+          <p:nvPr>
+            <p:ph type="body"/>
+          </p:nvPr>
+        </p:nvSpPr>
+        <p:spPr>
+          <a:xfrm>
+            <a:off x="851040" y="3043800"/>
+            <a:ext cx="164880" cy="1567800"/>
+          </a:xfrm>
+          <a:prstGeom prst="rect">
+            <a:avLst/>
+          </a:prstGeom>
+        </p:spPr>
+        <p:txBody>
+          <a:bodyPr lIns="0" rIns="0" tIns="0" bIns="0">
+            <a:normAutofit fontScale="9000"/>
           </a:bodyPr>
           <a:p>
             <a:endParaRPr b="0" lang="en-US" sz="3200" spc="-1" strike="noStrike">
@@ -2109,7 +3466,7 @@
         <p:spPr>
           <a:xfrm>
             <a:off x="504000" y="210600"/>
-            <a:ext cx="7018560" cy="946800"/>
+            <a:ext cx="7018200" cy="946800"/>
           </a:xfrm>
           <a:prstGeom prst="rect">
             <a:avLst/>
@@ -2140,7 +3497,7 @@
         <p:spPr>
           <a:xfrm>
             <a:off x="504000" y="1326600"/>
-            <a:ext cx="513720" cy="3287520"/>
+            <a:ext cx="250200" cy="3287160"/>
           </a:xfrm>
           <a:prstGeom prst="rect">
             <a:avLst/>
@@ -2169,8 +3526,8 @@
         </p:nvSpPr>
         <p:spPr>
           <a:xfrm>
-            <a:off x="1043640" y="1326600"/>
-            <a:ext cx="513720" cy="3287520"/>
+            <a:off x="767160" y="1326600"/>
+            <a:ext cx="250200" cy="3287160"/>
           </a:xfrm>
           <a:prstGeom prst="rect">
             <a:avLst/>
@@ -2222,7 +3579,7 @@
         <p:spPr>
           <a:xfrm>
             <a:off x="504000" y="210600"/>
-            <a:ext cx="7018560" cy="946800"/>
+            <a:ext cx="7018200" cy="946800"/>
           </a:xfrm>
           <a:prstGeom prst="rect">
             <a:avLst/>
@@ -2275,7 +3632,7 @@
         <p:spPr>
           <a:xfrm>
             <a:off x="504000" y="210600"/>
-            <a:ext cx="7018560" cy="4390200"/>
+            <a:ext cx="7018200" cy="4390200"/>
           </a:xfrm>
           <a:prstGeom prst="rect">
             <a:avLst/>
@@ -2328,7 +3685,7 @@
         <p:spPr>
           <a:xfrm>
             <a:off x="504000" y="210600"/>
-            <a:ext cx="7018560" cy="946800"/>
+            <a:ext cx="7018200" cy="946800"/>
           </a:xfrm>
           <a:prstGeom prst="rect">
             <a:avLst/>
@@ -2359,7 +3716,7 @@
         <p:spPr>
           <a:xfrm>
             <a:off x="504000" y="1326600"/>
-            <a:ext cx="513720" cy="1567800"/>
+            <a:ext cx="250200" cy="1567800"/>
           </a:xfrm>
           <a:prstGeom prst="rect">
             <a:avLst/>
@@ -2388,8 +3745,8 @@
         </p:nvSpPr>
         <p:spPr>
           <a:xfrm>
-            <a:off x="1043640" y="1326600"/>
-            <a:ext cx="513720" cy="3287520"/>
+            <a:off x="767160" y="1326600"/>
+            <a:ext cx="250200" cy="3287160"/>
           </a:xfrm>
           <a:prstGeom prst="rect">
             <a:avLst/>
@@ -2419,7 +3776,7 @@
         <p:spPr>
           <a:xfrm>
             <a:off x="504000" y="3043800"/>
-            <a:ext cx="513720" cy="1567800"/>
+            <a:ext cx="250200" cy="1567800"/>
           </a:xfrm>
           <a:prstGeom prst="rect">
             <a:avLst/>
@@ -2471,7 +3828,7 @@
         <p:spPr>
           <a:xfrm>
             <a:off x="504000" y="210600"/>
-            <a:ext cx="7018560" cy="946800"/>
+            <a:ext cx="7018200" cy="946800"/>
           </a:xfrm>
           <a:prstGeom prst="rect">
             <a:avLst/>
@@ -2502,7 +3859,7 @@
         <p:spPr>
           <a:xfrm>
             <a:off x="504000" y="1326600"/>
-            <a:ext cx="513720" cy="3287520"/>
+            <a:ext cx="250200" cy="3287160"/>
           </a:xfrm>
           <a:prstGeom prst="rect">
             <a:avLst/>
@@ -2531,8 +3888,8 @@
         </p:nvSpPr>
         <p:spPr>
           <a:xfrm>
-            <a:off x="1043640" y="1326600"/>
-            <a:ext cx="513720" cy="1567800"/>
+            <a:off x="767160" y="1326600"/>
+            <a:ext cx="250200" cy="1567800"/>
           </a:xfrm>
           <a:prstGeom prst="rect">
             <a:avLst/>
@@ -2561,8 +3918,8 @@
         </p:nvSpPr>
         <p:spPr>
           <a:xfrm>
-            <a:off x="1043640" y="3043800"/>
-            <a:ext cx="513720" cy="1567800"/>
+            <a:off x="767160" y="3043800"/>
+            <a:ext cx="250200" cy="1567800"/>
           </a:xfrm>
           <a:prstGeom prst="rect">
             <a:avLst/>
@@ -2614,7 +3971,7 @@
         <p:spPr>
           <a:xfrm>
             <a:off x="504000" y="210600"/>
-            <a:ext cx="7018560" cy="946800"/>
+            <a:ext cx="7018200" cy="946800"/>
           </a:xfrm>
           <a:prstGeom prst="rect">
             <a:avLst/>
@@ -2645,7 +4002,7 @@
         <p:spPr>
           <a:xfrm>
             <a:off x="504000" y="1326600"/>
-            <a:ext cx="513720" cy="1567800"/>
+            <a:ext cx="250200" cy="1567800"/>
           </a:xfrm>
           <a:prstGeom prst="rect">
             <a:avLst/>
@@ -2674,8 +4031,8 @@
         </p:nvSpPr>
         <p:spPr>
           <a:xfrm>
-            <a:off x="1043640" y="1326600"/>
-            <a:ext cx="513720" cy="1567800"/>
+            <a:off x="767160" y="1326600"/>
+            <a:ext cx="250200" cy="1567800"/>
           </a:xfrm>
           <a:prstGeom prst="rect">
             <a:avLst/>
@@ -2705,15 +4062,15 @@
         <p:spPr>
           <a:xfrm>
             <a:off x="504000" y="3043800"/>
-            <a:ext cx="1053360" cy="1567800"/>
-          </a:xfrm>
-          <a:prstGeom prst="rect">
-            <a:avLst/>
-          </a:prstGeom>
-        </p:spPr>
-        <p:txBody>
-          <a:bodyPr lIns="0" rIns="0" tIns="0" bIns="0">
-            <a:normAutofit fontScale="34000"/>
+            <a:ext cx="513360" cy="1567800"/>
+          </a:xfrm>
+          <a:prstGeom prst="rect">
+            <a:avLst/>
+          </a:prstGeom>
+        </p:spPr>
+        <p:txBody>
+          <a:bodyPr lIns="0" rIns="0" tIns="0" bIns="0">
+            <a:normAutofit fontScale="9000"/>
           </a:bodyPr>
           <a:p>
             <a:endParaRPr b="0" lang="en-US" sz="3200" spc="-1" strike="noStrike">
@@ -2757,7 +4114,7 @@
         <p:spPr>
           <a:xfrm>
             <a:off x="-58320" y="81000"/>
-            <a:ext cx="7792920" cy="1204200"/>
+            <a:ext cx="7792560" cy="1203840"/>
           </a:xfrm>
           <a:prstGeom prst="rect">
             <a:avLst/>
@@ -3033,7 +4390,7 @@
         <p:spPr>
           <a:xfrm>
             <a:off x="-58320" y="81000"/>
-            <a:ext cx="7792920" cy="1204200"/>
+            <a:ext cx="7792560" cy="1203840"/>
           </a:xfrm>
           <a:prstGeom prst="rect">
             <a:avLst/>
@@ -3056,7 +4413,7 @@
         <p:spPr>
           <a:xfrm>
             <a:off x="504000" y="210600"/>
-            <a:ext cx="7018560" cy="946800"/>
+            <a:ext cx="7018200" cy="946800"/>
           </a:xfrm>
           <a:prstGeom prst="rect">
             <a:avLst/>
@@ -3092,15 +4449,15 @@
         <p:spPr>
           <a:xfrm>
             <a:off x="504000" y="1326600"/>
-            <a:ext cx="1053360" cy="3287520"/>
-          </a:xfrm>
-          <a:prstGeom prst="rect">
-            <a:avLst/>
-          </a:prstGeom>
-        </p:spPr>
-        <p:txBody>
-          <a:bodyPr lIns="0" rIns="0" tIns="0" bIns="0">
-            <a:normAutofit fontScale="3000"/>
+            <a:ext cx="513360" cy="1567440"/>
+          </a:xfrm>
+          <a:prstGeom prst="rect">
+            <a:avLst/>
+          </a:prstGeom>
+        </p:spPr>
+        <p:txBody>
+          <a:bodyPr lIns="0" rIns="0" tIns="0" bIns="0">
+            <a:normAutofit/>
           </a:bodyPr>
           <a:p>
             <a:pPr marL="432000" indent="-324000">
@@ -3270,16 +4627,16 @@
         </p:nvSpPr>
         <p:spPr>
           <a:xfrm>
-            <a:off x="1610640" y="1326600"/>
-            <a:ext cx="1053360" cy="3287520"/>
-          </a:xfrm>
-          <a:prstGeom prst="rect">
-            <a:avLst/>
-          </a:prstGeom>
-        </p:spPr>
-        <p:txBody>
-          <a:bodyPr lIns="0" rIns="0" tIns="0" bIns="0">
-            <a:normAutofit fontScale="3000"/>
+            <a:off x="1043640" y="1326600"/>
+            <a:ext cx="513360" cy="3287160"/>
+          </a:xfrm>
+          <a:prstGeom prst="rect">
+            <a:avLst/>
+          </a:prstGeom>
+        </p:spPr>
+        <p:txBody>
+          <a:bodyPr lIns="0" rIns="0" tIns="0" bIns="0">
+            <a:normAutofit fontScale="2000"/>
           </a:bodyPr>
           <a:p>
             <a:pPr marL="432000" indent="-324000">
@@ -3437,6 +4794,185 @@
           </a:p>
         </p:txBody>
       </p:sp>
+      <p:sp>
+        <p:nvSpPr>
+          <p:cNvPr id="43" name="PlaceHolder 4"/>
+          <p:cNvSpPr>
+            <a:spLocks noGrp="1"/>
+          </p:cNvSpPr>
+          <p:nvPr>
+            <p:ph type="body"/>
+          </p:nvPr>
+        </p:nvSpPr>
+        <p:spPr>
+          <a:xfrm>
+            <a:off x="504000" y="3043800"/>
+            <a:ext cx="513360" cy="1567440"/>
+          </a:xfrm>
+          <a:prstGeom prst="rect">
+            <a:avLst/>
+          </a:prstGeom>
+        </p:spPr>
+        <p:txBody>
+          <a:bodyPr lIns="0" rIns="0" tIns="0" bIns="0">
+            <a:normAutofit/>
+          </a:bodyPr>
+          <a:p>
+            <a:pPr marL="432000" indent="-324000">
+              <a:spcBef>
+                <a:spcPts val="1417"/>
+              </a:spcBef>
+              <a:buClr>
+                <a:srgbClr val="000000"/>
+              </a:buClr>
+              <a:buSzPct val="45000"/>
+              <a:buFont typeface="Wingdings" charset="2"/>
+              <a:buChar char=""/>
+            </a:pPr>
+            <a:r>
+              <a:rPr b="0" lang="en-US" sz="1800" spc="-1" strike="noStrike">
+                <a:latin typeface="Arial"/>
+              </a:rPr>
+              <a:t>Click to edit the outline text format</a:t>
+            </a:r>
+            <a:endParaRPr b="0" lang="en-US" sz="1800" spc="-1" strike="noStrike">
+              <a:latin typeface="Arial"/>
+            </a:endParaRPr>
+          </a:p>
+          <a:p>
+            <a:pPr lvl="1" marL="864000" indent="-324000">
+              <a:spcBef>
+                <a:spcPts val="1134"/>
+              </a:spcBef>
+              <a:buClr>
+                <a:srgbClr val="000000"/>
+              </a:buClr>
+              <a:buSzPct val="75000"/>
+              <a:buFont typeface="Symbol" charset="2"/>
+              <a:buChar char=""/>
+            </a:pPr>
+            <a:r>
+              <a:rPr b="0" lang="en-US" sz="1800" spc="-1" strike="noStrike">
+                <a:latin typeface="Arial"/>
+              </a:rPr>
+              <a:t>Second Outline Level</a:t>
+            </a:r>
+            <a:endParaRPr b="0" lang="en-US" sz="1800" spc="-1" strike="noStrike">
+              <a:latin typeface="Arial"/>
+            </a:endParaRPr>
+          </a:p>
+          <a:p>
+            <a:pPr lvl="2" marL="1296000" indent="-288000">
+              <a:spcBef>
+                <a:spcPts val="850"/>
+              </a:spcBef>
+              <a:buClr>
+                <a:srgbClr val="000000"/>
+              </a:buClr>
+              <a:buSzPct val="45000"/>
+              <a:buFont typeface="Wingdings" charset="2"/>
+              <a:buChar char=""/>
+            </a:pPr>
+            <a:r>
+              <a:rPr b="0" lang="en-US" sz="1800" spc="-1" strike="noStrike">
+                <a:latin typeface="Arial"/>
+              </a:rPr>
+              <a:t>Third Outline Level</a:t>
+            </a:r>
+            <a:endParaRPr b="0" lang="en-US" sz="1800" spc="-1" strike="noStrike">
+              <a:latin typeface="Arial"/>
+            </a:endParaRPr>
+          </a:p>
+          <a:p>
+            <a:pPr lvl="3" marL="1728000" indent="-216000">
+              <a:spcBef>
+                <a:spcPts val="567"/>
+              </a:spcBef>
+              <a:buClr>
+                <a:srgbClr val="000000"/>
+              </a:buClr>
+              <a:buSzPct val="75000"/>
+              <a:buFont typeface="Symbol" charset="2"/>
+              <a:buChar char=""/>
+            </a:pPr>
+            <a:r>
+              <a:rPr b="0" lang="en-US" sz="1800" spc="-1" strike="noStrike">
+                <a:latin typeface="Arial"/>
+              </a:rPr>
+              <a:t>Fourth Outline Level</a:t>
+            </a:r>
+            <a:endParaRPr b="0" lang="en-US" sz="1800" spc="-1" strike="noStrike">
+              <a:latin typeface="Arial"/>
+            </a:endParaRPr>
+          </a:p>
+          <a:p>
+            <a:pPr lvl="4" marL="2160000" indent="-216000">
+              <a:spcBef>
+                <a:spcPts val="283"/>
+              </a:spcBef>
+              <a:buClr>
+                <a:srgbClr val="000000"/>
+              </a:buClr>
+              <a:buSzPct val="45000"/>
+              <a:buFont typeface="Wingdings" charset="2"/>
+              <a:buChar char=""/>
+            </a:pPr>
+            <a:r>
+              <a:rPr b="0" lang="en-US" sz="1800" spc="-1" strike="noStrike">
+                <a:latin typeface="Arial"/>
+              </a:rPr>
+              <a:t>Fifth Outline Level</a:t>
+            </a:r>
+            <a:endParaRPr b="0" lang="en-US" sz="1800" spc="-1" strike="noStrike">
+              <a:latin typeface="Arial"/>
+            </a:endParaRPr>
+          </a:p>
+          <a:p>
+            <a:pPr lvl="5" marL="2592000" indent="-216000">
+              <a:spcBef>
+                <a:spcPts val="283"/>
+              </a:spcBef>
+              <a:buClr>
+                <a:srgbClr val="000000"/>
+              </a:buClr>
+              <a:buSzPct val="45000"/>
+              <a:buFont typeface="Wingdings" charset="2"/>
+              <a:buChar char=""/>
+            </a:pPr>
+            <a:r>
+              <a:rPr b="0" lang="en-US" sz="1800" spc="-1" strike="noStrike">
+                <a:latin typeface="Arial"/>
+              </a:rPr>
+              <a:t>Sixth Outline Level</a:t>
+            </a:r>
+            <a:endParaRPr b="0" lang="en-US" sz="1800" spc="-1" strike="noStrike">
+              <a:latin typeface="Arial"/>
+            </a:endParaRPr>
+          </a:p>
+          <a:p>
+            <a:pPr lvl="6" marL="3024000" indent="-216000">
+              <a:spcBef>
+                <a:spcPts val="283"/>
+              </a:spcBef>
+              <a:buClr>
+                <a:srgbClr val="000000"/>
+              </a:buClr>
+              <a:buSzPct val="45000"/>
+              <a:buFont typeface="Wingdings" charset="2"/>
+              <a:buChar char=""/>
+            </a:pPr>
+            <a:r>
+              <a:rPr b="0" lang="en-US" sz="1800" spc="-1" strike="noStrike">
+                <a:latin typeface="Arial"/>
+              </a:rPr>
+              <a:t>Seventh Outline Level</a:t>
+            </a:r>
+            <a:endParaRPr b="0" lang="en-US" sz="1800" spc="-1" strike="noStrike">
+              <a:latin typeface="Arial"/>
+            </a:endParaRPr>
+          </a:p>
+        </p:txBody>
+      </p:sp>
     </p:spTree>
   </p:cSld>
   <p:clrMap bg1="lt1" bg2="lt2" tx1="dk1" tx2="dk2" accent1="accent1" accent2="accent2" accent3="accent3" accent4="accent4" accent5="accent5" accent6="accent6" hlink="hlink" folHlink="folHlink"/>
@@ -3453,6 +4989,460 @@
     <p:sldLayoutId id="2147483671" r:id="rId12"/>
     <p:sldLayoutId id="2147483672" r:id="rId13"/>
     <p:sldLayoutId id="2147483673" r:id="rId14"/>
+  </p:sldLayoutIdLst>
+</p:sldMaster>
+</file>
+
+<file path=ppt/slideMasters/slideMaster3.xml><?xml version="1.0" encoding="utf-8"?>
+<p:sldMaster xmlns:a="http://schemas.openxmlformats.org/drawingml/2006/main" xmlns:p="http://schemas.openxmlformats.org/presentationml/2006/main" xmlns:r="http://schemas.openxmlformats.org/officeDocument/2006/relationships" xmlns:p14="http://schemas.microsoft.com/office/powerpoint/2010/main" xmlns:p15="http://schemas.microsoft.com/office/powerpoint/2012/main" xmlns:mc="http://schemas.openxmlformats.org/markup-compatibility/2006">
+  <p:cSld>
+    <p:spTree>
+      <p:nvGrpSpPr>
+        <p:cNvPr id="1" name=""/>
+        <p:cNvGrpSpPr/>
+        <p:nvPr/>
+      </p:nvGrpSpPr>
+      <p:grpSpPr>
+        <a:xfrm>
+          <a:off x="0" y="0"/>
+          <a:ext cx="0" cy="0"/>
+          <a:chOff x="0" y="0"/>
+          <a:chExt cx="0" cy="0"/>
+        </a:xfrm>
+      </p:grpSpPr>
+      <p:pic>
+        <p:nvPicPr>
+          <p:cNvPr id="80" name="" descr=""/>
+          <p:cNvPicPr/>
+          <p:nvPr/>
+        </p:nvPicPr>
+        <p:blipFill>
+          <a:blip r:embed="rId2"/>
+          <a:stretch/>
+        </p:blipFill>
+        <p:spPr>
+          <a:xfrm>
+            <a:off x="-58320" y="81000"/>
+            <a:ext cx="7792560" cy="1203840"/>
+          </a:xfrm>
+          <a:prstGeom prst="rect">
+            <a:avLst/>
+          </a:prstGeom>
+          <a:ln>
+            <a:noFill/>
+          </a:ln>
+        </p:spPr>
+      </p:pic>
+      <p:sp>
+        <p:nvSpPr>
+          <p:cNvPr id="81" name="PlaceHolder 1"/>
+          <p:cNvSpPr>
+            <a:spLocks noGrp="1"/>
+          </p:cNvSpPr>
+          <p:nvPr>
+            <p:ph type="title"/>
+          </p:nvPr>
+        </p:nvSpPr>
+        <p:spPr>
+          <a:xfrm>
+            <a:off x="504000" y="210600"/>
+            <a:ext cx="7018200" cy="946800"/>
+          </a:xfrm>
+          <a:prstGeom prst="rect">
+            <a:avLst/>
+          </a:prstGeom>
+        </p:spPr>
+        <p:txBody>
+          <a:bodyPr lIns="0" rIns="0" tIns="0" bIns="0" anchor="ctr">
+            <a:spAutoFit/>
+          </a:bodyPr>
+          <a:p>
+            <a:r>
+              <a:rPr b="0" lang="en-US" sz="1800" spc="-1" strike="noStrike">
+                <a:latin typeface="Arial"/>
+              </a:rPr>
+              <a:t>Click to edit the title text format</a:t>
+            </a:r>
+            <a:endParaRPr b="0" lang="en-US" sz="1800" spc="-1" strike="noStrike">
+              <a:latin typeface="Arial"/>
+            </a:endParaRPr>
+          </a:p>
+        </p:txBody>
+      </p:sp>
+      <p:sp>
+        <p:nvSpPr>
+          <p:cNvPr id="82" name="PlaceHolder 2"/>
+          <p:cNvSpPr>
+            <a:spLocks noGrp="1"/>
+          </p:cNvSpPr>
+          <p:nvPr>
+            <p:ph type="body"/>
+          </p:nvPr>
+        </p:nvSpPr>
+        <p:spPr>
+          <a:xfrm>
+            <a:off x="504000" y="1326600"/>
+            <a:ext cx="513360" cy="3287160"/>
+          </a:xfrm>
+          <a:prstGeom prst="rect">
+            <a:avLst/>
+          </a:prstGeom>
+        </p:spPr>
+        <p:txBody>
+          <a:bodyPr lIns="0" rIns="0" tIns="0" bIns="0">
+            <a:normAutofit fontScale="2000"/>
+          </a:bodyPr>
+          <a:p>
+            <a:pPr marL="432000" indent="-324000">
+              <a:spcBef>
+                <a:spcPts val="1417"/>
+              </a:spcBef>
+              <a:buClr>
+                <a:srgbClr val="000000"/>
+              </a:buClr>
+              <a:buSzPct val="45000"/>
+              <a:buFont typeface="Wingdings" charset="2"/>
+              <a:buChar char=""/>
+            </a:pPr>
+            <a:r>
+              <a:rPr b="0" lang="en-US" sz="1800" spc="-1" strike="noStrike">
+                <a:latin typeface="Arial"/>
+              </a:rPr>
+              <a:t>Click to edit the outline text format</a:t>
+            </a:r>
+            <a:endParaRPr b="0" lang="en-US" sz="1800" spc="-1" strike="noStrike">
+              <a:latin typeface="Arial"/>
+            </a:endParaRPr>
+          </a:p>
+          <a:p>
+            <a:pPr lvl="1" marL="864000" indent="-324000">
+              <a:spcBef>
+                <a:spcPts val="1134"/>
+              </a:spcBef>
+              <a:buClr>
+                <a:srgbClr val="000000"/>
+              </a:buClr>
+              <a:buSzPct val="75000"/>
+              <a:buFont typeface="Symbol" charset="2"/>
+              <a:buChar char=""/>
+            </a:pPr>
+            <a:r>
+              <a:rPr b="0" lang="en-US" sz="1800" spc="-1" strike="noStrike">
+                <a:latin typeface="Arial"/>
+              </a:rPr>
+              <a:t>Second Outline Level</a:t>
+            </a:r>
+            <a:endParaRPr b="0" lang="en-US" sz="1800" spc="-1" strike="noStrike">
+              <a:latin typeface="Arial"/>
+            </a:endParaRPr>
+          </a:p>
+          <a:p>
+            <a:pPr lvl="2" marL="1296000" indent="-288000">
+              <a:spcBef>
+                <a:spcPts val="850"/>
+              </a:spcBef>
+              <a:buClr>
+                <a:srgbClr val="000000"/>
+              </a:buClr>
+              <a:buSzPct val="45000"/>
+              <a:buFont typeface="Wingdings" charset="2"/>
+              <a:buChar char=""/>
+            </a:pPr>
+            <a:r>
+              <a:rPr b="0" lang="en-US" sz="1800" spc="-1" strike="noStrike">
+                <a:latin typeface="Arial"/>
+              </a:rPr>
+              <a:t>Third Outline Level</a:t>
+            </a:r>
+            <a:endParaRPr b="0" lang="en-US" sz="1800" spc="-1" strike="noStrike">
+              <a:latin typeface="Arial"/>
+            </a:endParaRPr>
+          </a:p>
+          <a:p>
+            <a:pPr lvl="3" marL="1728000" indent="-216000">
+              <a:spcBef>
+                <a:spcPts val="567"/>
+              </a:spcBef>
+              <a:buClr>
+                <a:srgbClr val="000000"/>
+              </a:buClr>
+              <a:buSzPct val="75000"/>
+              <a:buFont typeface="Symbol" charset="2"/>
+              <a:buChar char=""/>
+            </a:pPr>
+            <a:r>
+              <a:rPr b="0" lang="en-US" sz="1800" spc="-1" strike="noStrike">
+                <a:latin typeface="Arial"/>
+              </a:rPr>
+              <a:t>Fourth Outline Level</a:t>
+            </a:r>
+            <a:endParaRPr b="0" lang="en-US" sz="1800" spc="-1" strike="noStrike">
+              <a:latin typeface="Arial"/>
+            </a:endParaRPr>
+          </a:p>
+          <a:p>
+            <a:pPr lvl="4" marL="2160000" indent="-216000">
+              <a:spcBef>
+                <a:spcPts val="283"/>
+              </a:spcBef>
+              <a:buClr>
+                <a:srgbClr val="000000"/>
+              </a:buClr>
+              <a:buSzPct val="45000"/>
+              <a:buFont typeface="Wingdings" charset="2"/>
+              <a:buChar char=""/>
+            </a:pPr>
+            <a:r>
+              <a:rPr b="0" lang="en-US" sz="1800" spc="-1" strike="noStrike">
+                <a:latin typeface="Arial"/>
+              </a:rPr>
+              <a:t>Fifth Outline Level</a:t>
+            </a:r>
+            <a:endParaRPr b="0" lang="en-US" sz="1800" spc="-1" strike="noStrike">
+              <a:latin typeface="Arial"/>
+            </a:endParaRPr>
+          </a:p>
+          <a:p>
+            <a:pPr lvl="5" marL="2592000" indent="-216000">
+              <a:spcBef>
+                <a:spcPts val="283"/>
+              </a:spcBef>
+              <a:buClr>
+                <a:srgbClr val="000000"/>
+              </a:buClr>
+              <a:buSzPct val="45000"/>
+              <a:buFont typeface="Wingdings" charset="2"/>
+              <a:buChar char=""/>
+            </a:pPr>
+            <a:r>
+              <a:rPr b="0" lang="en-US" sz="1800" spc="-1" strike="noStrike">
+                <a:latin typeface="Arial"/>
+              </a:rPr>
+              <a:t>Sixth Outline Level</a:t>
+            </a:r>
+            <a:endParaRPr b="0" lang="en-US" sz="1800" spc="-1" strike="noStrike">
+              <a:latin typeface="Arial"/>
+            </a:endParaRPr>
+          </a:p>
+          <a:p>
+            <a:pPr lvl="6" marL="3024000" indent="-216000">
+              <a:spcBef>
+                <a:spcPts val="283"/>
+              </a:spcBef>
+              <a:buClr>
+                <a:srgbClr val="000000"/>
+              </a:buClr>
+              <a:buSzPct val="45000"/>
+              <a:buFont typeface="Wingdings" charset="2"/>
+              <a:buChar char=""/>
+            </a:pPr>
+            <a:r>
+              <a:rPr b="0" lang="en-US" sz="1800" spc="-1" strike="noStrike">
+                <a:latin typeface="Arial"/>
+              </a:rPr>
+              <a:t>Seventh Outline Level</a:t>
+            </a:r>
+            <a:endParaRPr b="0" lang="en-US" sz="1800" spc="-1" strike="noStrike">
+              <a:latin typeface="Arial"/>
+            </a:endParaRPr>
+          </a:p>
+        </p:txBody>
+      </p:sp>
+      <p:sp>
+        <p:nvSpPr>
+          <p:cNvPr id="83" name="PlaceHolder 3"/>
+          <p:cNvSpPr>
+            <a:spLocks noGrp="1"/>
+          </p:cNvSpPr>
+          <p:nvPr>
+            <p:ph type="body"/>
+          </p:nvPr>
+        </p:nvSpPr>
+        <p:spPr>
+          <a:xfrm>
+            <a:off x="1043640" y="1326600"/>
+            <a:ext cx="513360" cy="3287160"/>
+          </a:xfrm>
+          <a:prstGeom prst="rect">
+            <a:avLst/>
+          </a:prstGeom>
+        </p:spPr>
+        <p:txBody>
+          <a:bodyPr lIns="0" rIns="0" tIns="0" bIns="0">
+            <a:normAutofit fontScale="2000"/>
+          </a:bodyPr>
+          <a:p>
+            <a:pPr marL="432000" indent="-324000">
+              <a:spcBef>
+                <a:spcPts val="1417"/>
+              </a:spcBef>
+              <a:buClr>
+                <a:srgbClr val="000000"/>
+              </a:buClr>
+              <a:buSzPct val="45000"/>
+              <a:buFont typeface="Wingdings" charset="2"/>
+              <a:buChar char=""/>
+            </a:pPr>
+            <a:r>
+              <a:rPr b="0" lang="en-US" sz="1800" spc="-1" strike="noStrike">
+                <a:latin typeface="Arial"/>
+              </a:rPr>
+              <a:t>Click to edit the outline text format</a:t>
+            </a:r>
+            <a:endParaRPr b="0" lang="en-US" sz="1800" spc="-1" strike="noStrike">
+              <a:latin typeface="Arial"/>
+            </a:endParaRPr>
+          </a:p>
+          <a:p>
+            <a:pPr lvl="1" marL="864000" indent="-324000">
+              <a:spcBef>
+                <a:spcPts val="1134"/>
+              </a:spcBef>
+              <a:buClr>
+                <a:srgbClr val="000000"/>
+              </a:buClr>
+              <a:buSzPct val="75000"/>
+              <a:buFont typeface="Symbol" charset="2"/>
+              <a:buChar char=""/>
+            </a:pPr>
+            <a:r>
+              <a:rPr b="0" lang="en-US" sz="1800" spc="-1" strike="noStrike">
+                <a:latin typeface="Arial"/>
+              </a:rPr>
+              <a:t>Second Outline Level</a:t>
+            </a:r>
+            <a:endParaRPr b="0" lang="en-US" sz="1800" spc="-1" strike="noStrike">
+              <a:latin typeface="Arial"/>
+            </a:endParaRPr>
+          </a:p>
+          <a:p>
+            <a:pPr lvl="2" marL="1296000" indent="-288000">
+              <a:spcBef>
+                <a:spcPts val="850"/>
+              </a:spcBef>
+              <a:buClr>
+                <a:srgbClr val="000000"/>
+              </a:buClr>
+              <a:buSzPct val="45000"/>
+              <a:buFont typeface="Wingdings" charset="2"/>
+              <a:buChar char=""/>
+            </a:pPr>
+            <a:r>
+              <a:rPr b="0" lang="en-US" sz="1800" spc="-1" strike="noStrike">
+                <a:latin typeface="Arial"/>
+              </a:rPr>
+              <a:t>Third Outline Level</a:t>
+            </a:r>
+            <a:endParaRPr b="0" lang="en-US" sz="1800" spc="-1" strike="noStrike">
+              <a:latin typeface="Arial"/>
+            </a:endParaRPr>
+          </a:p>
+          <a:p>
+            <a:pPr lvl="3" marL="1728000" indent="-216000">
+              <a:spcBef>
+                <a:spcPts val="567"/>
+              </a:spcBef>
+              <a:buClr>
+                <a:srgbClr val="000000"/>
+              </a:buClr>
+              <a:buSzPct val="75000"/>
+              <a:buFont typeface="Symbol" charset="2"/>
+              <a:buChar char=""/>
+            </a:pPr>
+            <a:r>
+              <a:rPr b="0" lang="en-US" sz="1800" spc="-1" strike="noStrike">
+                <a:latin typeface="Arial"/>
+              </a:rPr>
+              <a:t>Fourth Outline Level</a:t>
+            </a:r>
+            <a:endParaRPr b="0" lang="en-US" sz="1800" spc="-1" strike="noStrike">
+              <a:latin typeface="Arial"/>
+            </a:endParaRPr>
+          </a:p>
+          <a:p>
+            <a:pPr lvl="4" marL="2160000" indent="-216000">
+              <a:spcBef>
+                <a:spcPts val="283"/>
+              </a:spcBef>
+              <a:buClr>
+                <a:srgbClr val="000000"/>
+              </a:buClr>
+              <a:buSzPct val="45000"/>
+              <a:buFont typeface="Wingdings" charset="2"/>
+              <a:buChar char=""/>
+            </a:pPr>
+            <a:r>
+              <a:rPr b="0" lang="en-US" sz="1800" spc="-1" strike="noStrike">
+                <a:latin typeface="Arial"/>
+              </a:rPr>
+              <a:t>Fifth Outline Level</a:t>
+            </a:r>
+            <a:endParaRPr b="0" lang="en-US" sz="1800" spc="-1" strike="noStrike">
+              <a:latin typeface="Arial"/>
+            </a:endParaRPr>
+          </a:p>
+          <a:p>
+            <a:pPr lvl="5" marL="2592000" indent="-216000">
+              <a:spcBef>
+                <a:spcPts val="283"/>
+              </a:spcBef>
+              <a:buClr>
+                <a:srgbClr val="000000"/>
+              </a:buClr>
+              <a:buSzPct val="45000"/>
+              <a:buFont typeface="Wingdings" charset="2"/>
+              <a:buChar char=""/>
+            </a:pPr>
+            <a:r>
+              <a:rPr b="0" lang="en-US" sz="1800" spc="-1" strike="noStrike">
+                <a:latin typeface="Arial"/>
+              </a:rPr>
+              <a:t>Sixth Outline Level</a:t>
+            </a:r>
+            <a:endParaRPr b="0" lang="en-US" sz="1800" spc="-1" strike="noStrike">
+              <a:latin typeface="Arial"/>
+            </a:endParaRPr>
+          </a:p>
+          <a:p>
+            <a:pPr lvl="6" marL="3024000" indent="-216000">
+              <a:spcBef>
+                <a:spcPts val="283"/>
+              </a:spcBef>
+              <a:buClr>
+                <a:srgbClr val="000000"/>
+              </a:buClr>
+              <a:buSzPct val="45000"/>
+              <a:buFont typeface="Wingdings" charset="2"/>
+              <a:buChar char=""/>
+            </a:pPr>
+            <a:r>
+              <a:rPr b="0" lang="en-US" sz="1800" spc="-1" strike="noStrike">
+                <a:latin typeface="Arial"/>
+              </a:rPr>
+              <a:t>Seventh Outline Level</a:t>
+            </a:r>
+            <a:endParaRPr b="0" lang="en-US" sz="1800" spc="-1" strike="noStrike">
+              <a:latin typeface="Arial"/>
+            </a:endParaRPr>
+          </a:p>
+        </p:txBody>
+      </p:sp>
+    </p:spTree>
+  </p:cSld>
+  <p:clrMap bg1="lt1" bg2="lt2" tx1="dk1" tx2="dk2" accent1="accent1" accent2="accent2" accent3="accent3" accent4="accent4" accent5="accent5" accent6="accent6" hlink="hlink" folHlink="folHlink"/>
+  <p:sldLayoutIdLst>
+    <p:sldLayoutId id="2147483675" r:id="rId3"/>
+    <p:sldLayoutId id="2147483676" r:id="rId4"/>
+    <p:sldLayoutId id="2147483677" r:id="rId5"/>
+    <p:sldLayoutId id="2147483678" r:id="rId6"/>
+    <p:sldLayoutId id="2147483679" r:id="rId7"/>
+    <p:sldLayoutId id="2147483680" r:id="rId8"/>
+    <p:sldLayoutId id="2147483681" r:id="rId9"/>
+    <p:sldLayoutId id="2147483682" r:id="rId10"/>
+    <p:sldLayoutId id="2147483683" r:id="rId11"/>
+    <p:sldLayoutId id="2147483684" r:id="rId12"/>
+    <p:sldLayoutId id="2147483685" r:id="rId13"/>
+    <p:sldLayoutId id="2147483686" r:id="rId14"/>
   </p:sldLayoutIdLst>
 </p:sldMaster>
 </file>
@@ -3476,14 +5466,14 @@
       </p:grpSpPr>
       <p:sp>
         <p:nvSpPr>
-          <p:cNvPr id="79" name="CustomShape 1"/>
+          <p:cNvPr id="120" name="CustomShape 1"/>
           <p:cNvSpPr/>
           <p:nvPr/>
         </p:nvSpPr>
         <p:spPr>
           <a:xfrm>
             <a:off x="504000" y="411480"/>
-            <a:ext cx="7018560" cy="543240"/>
+            <a:ext cx="7018200" cy="542880"/>
           </a:xfrm>
           <a:prstGeom prst="rect">
             <a:avLst/>
@@ -3527,14 +5517,14 @@
       </p:sp>
       <p:sp>
         <p:nvSpPr>
-          <p:cNvPr id="80" name="CustomShape 2"/>
+          <p:cNvPr id="121" name="CustomShape 2"/>
           <p:cNvSpPr/>
           <p:nvPr/>
         </p:nvSpPr>
         <p:spPr>
           <a:xfrm>
             <a:off x="504000" y="2401560"/>
-            <a:ext cx="9070560" cy="1219320"/>
+            <a:ext cx="9070200" cy="1218960"/>
           </a:xfrm>
           <a:prstGeom prst="rect">
             <a:avLst/>
@@ -3678,14 +5668,14 @@
       </p:grpSpPr>
       <p:sp>
         <p:nvSpPr>
-          <p:cNvPr id="81" name="CustomShape 1"/>
+          <p:cNvPr id="122" name="CustomShape 1"/>
           <p:cNvSpPr/>
           <p:nvPr/>
         </p:nvSpPr>
         <p:spPr>
           <a:xfrm>
             <a:off x="504000" y="348120"/>
-            <a:ext cx="7018560" cy="670320"/>
+            <a:ext cx="7018200" cy="669960"/>
           </a:xfrm>
           <a:prstGeom prst="rect">
             <a:avLst/>
@@ -3729,14 +5719,14 @@
       </p:sp>
       <p:sp>
         <p:nvSpPr>
-          <p:cNvPr id="82" name="CustomShape 2"/>
+          <p:cNvPr id="123" name="CustomShape 2"/>
           <p:cNvSpPr/>
           <p:nvPr/>
         </p:nvSpPr>
         <p:spPr>
           <a:xfrm>
             <a:off x="504000" y="1326600"/>
-            <a:ext cx="4425840" cy="3287520"/>
+            <a:ext cx="4425480" cy="3287160"/>
           </a:xfrm>
           <a:prstGeom prst="rect">
             <a:avLst/>
@@ -3757,7 +5747,7 @@
             <a:normAutofit/>
           </a:bodyPr>
           <a:p>
-            <a:pPr marL="432000" indent="-322920">
+            <a:pPr marL="432000" indent="-322560">
               <a:lnSpc>
                 <a:spcPct val="100000"/>
               </a:lnSpc>
@@ -3786,7 +5776,7 @@
             </a:endParaRPr>
           </a:p>
           <a:p>
-            <a:pPr marL="432000" indent="-322920">
+            <a:pPr marL="432000" indent="-322560">
               <a:lnSpc>
                 <a:spcPct val="100000"/>
               </a:lnSpc>
@@ -3808,14 +5798,14 @@
                 <a:latin typeface="Arial"/>
                 <a:ea typeface="DejaVu Sans"/>
               </a:rPr>
-              <a:t>Finish Lesson 10:</a:t>
+              <a:t>Lesson 10:</a:t>
             </a:r>
             <a:endParaRPr b="0" lang="en-US" sz="2400" spc="-1" strike="noStrike">
               <a:latin typeface="Arial"/>
             </a:endParaRPr>
           </a:p>
           <a:p>
-            <a:pPr marL="432000" indent="-322920">
+            <a:pPr marL="432000" indent="-322560">
               <a:lnSpc>
                 <a:spcPct val="100000"/>
               </a:lnSpc>
@@ -3844,7 +5834,7 @@
             </a:endParaRPr>
           </a:p>
           <a:p>
-            <a:pPr marL="432000" indent="-322920">
+            <a:pPr marL="432000" indent="-322560">
               <a:lnSpc>
                 <a:spcPct val="100000"/>
               </a:lnSpc>
@@ -3866,7 +5856,7 @@
                 <a:latin typeface="Arial"/>
                 <a:ea typeface="DejaVu Sans"/>
               </a:rPr>
-              <a:t>07_batchnorm</a:t>
+              <a:t> </a:t>
             </a:r>
             <a:endParaRPr b="0" lang="en-US" sz="2400" spc="-1" strike="noStrike">
               <a:latin typeface="Arial"/>
@@ -3876,14 +5866,14 @@
       </p:sp>
       <p:sp>
         <p:nvSpPr>
-          <p:cNvPr id="83" name="CustomShape 3"/>
+          <p:cNvPr id="124" name="CustomShape 3"/>
           <p:cNvSpPr/>
           <p:nvPr/>
         </p:nvSpPr>
         <p:spPr>
           <a:xfrm>
             <a:off x="5152680" y="1326600"/>
-            <a:ext cx="4425840" cy="3287520"/>
+            <a:ext cx="4425480" cy="3287160"/>
           </a:xfrm>
           <a:prstGeom prst="rect">
             <a:avLst/>
@@ -3904,7 +5894,7 @@
             <a:normAutofit/>
           </a:bodyPr>
           <a:p>
-            <a:pPr marL="432000" indent="-322920">
+            <a:pPr marL="432000" indent="-322560">
               <a:lnSpc>
                 <a:spcPct val="100000"/>
               </a:lnSpc>
@@ -3933,7 +5923,7 @@
             </a:endParaRPr>
           </a:p>
           <a:p>
-            <a:pPr marL="432000" indent="-322920">
+            <a:pPr marL="432000" indent="-322560">
               <a:lnSpc>
                 <a:spcPct val="100000"/>
               </a:lnSpc>
@@ -3955,14 +5945,14 @@
                 <a:latin typeface="Arial"/>
                 <a:ea typeface="DejaVu Sans"/>
               </a:rPr>
-              <a:t>Start Lesson 11</a:t>
+              <a:t>FinishLesson 10</a:t>
             </a:r>
             <a:endParaRPr b="0" lang="en-US" sz="2400" spc="-1" strike="noStrike">
               <a:latin typeface="Arial"/>
             </a:endParaRPr>
           </a:p>
           <a:p>
-            <a:pPr marL="432000" indent="-322920">
+            <a:pPr marL="432000" indent="-322560">
               <a:lnSpc>
                 <a:spcPct val="100000"/>
               </a:lnSpc>
@@ -3972,7 +5962,7 @@
               <a:buClr>
                 <a:srgbClr val="000000"/>
               </a:buClr>
-              <a:buFont typeface="Symbol" charset="2"/>
+              <a:buFont typeface="Symbol"/>
               <a:buChar char=""/>
             </a:pPr>
             <a:r>
@@ -3990,7 +5980,7 @@
             </a:endParaRPr>
           </a:p>
           <a:p>
-            <a:pPr marL="432000" indent="-322920">
+            <a:pPr marL="432000" indent="-322560">
               <a:lnSpc>
                 <a:spcPct val="100000"/>
               </a:lnSpc>
@@ -4000,7 +5990,7 @@
               <a:buClr>
                 <a:srgbClr val="000000"/>
               </a:buClr>
-              <a:buFont typeface="Symbol" charset="2"/>
+              <a:buFont typeface="Symbol"/>
               <a:buChar char=""/>
             </a:pPr>
             <a:r>
@@ -4018,7 +6008,7 @@
             </a:endParaRPr>
           </a:p>
           <a:p>
-            <a:pPr marL="432000" indent="-322920">
+            <a:pPr marL="432000" indent="-322560">
               <a:lnSpc>
                 <a:spcPct val="100000"/>
               </a:lnSpc>
@@ -4028,7 +6018,7 @@
               <a:buClr>
                 <a:srgbClr val="000000"/>
               </a:buClr>
-              <a:buFont typeface="Symbol" charset="2"/>
+              <a:buFont typeface="Symbol"/>
               <a:buChar char=""/>
             </a:pPr>
             <a:r>
@@ -4049,14 +6039,14 @@
       </p:sp>
       <p:sp>
         <p:nvSpPr>
-          <p:cNvPr id="84" name="TextShape 4"/>
-          <p:cNvSpPr txBox="1"/>
+          <p:cNvPr id="125" name="CustomShape 4"/>
+          <p:cNvSpPr/>
           <p:nvPr/>
         </p:nvSpPr>
         <p:spPr>
           <a:xfrm>
             <a:off x="713520" y="4136400"/>
-            <a:ext cx="8702640" cy="1352880"/>
+            <a:ext cx="8702280" cy="1352520"/>
           </a:xfrm>
           <a:prstGeom prst="rect">
             <a:avLst/>
@@ -4071,12 +6061,21 @@
             <a:round/>
           </a:ln>
         </p:spPr>
+        <p:style>
+          <a:lnRef idx="0"/>
+          <a:fillRef idx="0"/>
+          <a:effectRef idx="0"/>
+          <a:fontRef idx="minor"/>
+        </p:style>
         <p:txBody>
           <a:bodyPr lIns="18360" rIns="18360" tIns="18360" bIns="18360">
             <a:normAutofit/>
           </a:bodyPr>
           <a:p>
-            <a:pPr marL="432000" indent="-324000">
+            <a:pPr marL="432000" indent="-323640">
+              <a:lnSpc>
+                <a:spcPct val="100000"/>
+              </a:lnSpc>
               <a:buClr>
                 <a:srgbClr val="000000"/>
               </a:buClr>
@@ -4094,15 +6093,14 @@
               <a:t>I’ll be away for the following two Saturdays, 9/21 and 9/24 Regular meetups will resume on Saturday 10/05</a:t>
             </a:r>
             <a:endParaRPr b="0" lang="en-US" sz="2400" spc="-1" strike="noStrike">
-              <a:solidFill>
-                <a:srgbClr val="c9211e"/>
-              </a:solidFill>
-              <a:latin typeface="Arial"/>
-              <a:ea typeface="Microsoft YaHei"/>
-            </a:endParaRPr>
-          </a:p>
-          <a:p>
-            <a:pPr marL="432000" indent="-324000">
+              <a:latin typeface="Arial"/>
+            </a:endParaRPr>
+          </a:p>
+          <a:p>
+            <a:pPr marL="432000" indent="-323640">
+              <a:lnSpc>
+                <a:spcPct val="100000"/>
+              </a:lnSpc>
               <a:buClr>
                 <a:srgbClr val="000000"/>
               </a:buClr>
@@ -4120,29 +6118,19 @@
               <a:t>Meanwhile, try to get caught up if you are behind.</a:t>
             </a:r>
             <a:endParaRPr b="0" lang="en-US" sz="2400" spc="-1" strike="noStrike">
-              <a:solidFill>
-                <a:srgbClr val="c9211e"/>
-              </a:solidFill>
-              <a:latin typeface="Arial"/>
-              <a:ea typeface="Microsoft YaHei"/>
-            </a:endParaRPr>
-          </a:p>
-          <a:p>
-            <a:pPr marL="432000" indent="-324000">
+              <a:latin typeface="Arial"/>
+            </a:endParaRPr>
+          </a:p>
+          <a:p>
+            <a:pPr>
+              <a:lnSpc>
+                <a:spcPct val="100000"/>
+              </a:lnSpc>
               <a:spcBef>
                 <a:spcPts val="1417"/>
               </a:spcBef>
-              <a:buClr>
-                <a:srgbClr val="000000"/>
-              </a:buClr>
-              <a:buSzPct val="45000"/>
-              <a:buFont typeface="Wingdings" charset="2"/>
-              <a:buChar char=""/>
             </a:pPr>
             <a:endParaRPr b="0" lang="en-US" sz="2400" spc="-1" strike="noStrike">
-              <a:solidFill>
-                <a:srgbClr val="c9211e"/>
-              </a:solidFill>
               <a:latin typeface="Arial"/>
             </a:endParaRPr>
           </a:p>
@@ -4180,14 +6168,14 @@
       </p:grpSpPr>
       <p:sp>
         <p:nvSpPr>
-          <p:cNvPr id="85" name="TextShape 1"/>
-          <p:cNvSpPr txBox="1"/>
+          <p:cNvPr id="126" name="CustomShape 1"/>
+          <p:cNvSpPr/>
           <p:nvPr/>
         </p:nvSpPr>
         <p:spPr>
           <a:xfrm>
             <a:off x="504000" y="210600"/>
-            <a:ext cx="7018560" cy="946800"/>
+            <a:ext cx="7018200" cy="946440"/>
           </a:xfrm>
           <a:prstGeom prst="rect">
             <a:avLst/>
@@ -4197,28 +6185,23 @@
             <a:noFill/>
           </a:ln>
         </p:spPr>
-        <p:txBody>
-          <a:bodyPr lIns="0" rIns="0" tIns="0" bIns="0" anchor="ctr">
-            <a:spAutoFit/>
-          </a:bodyPr>
-          <a:p>
-            <a:pPr algn="ctr"/>
-            <a:endParaRPr b="0" lang="en-US" sz="4400" spc="-1" strike="noStrike">
-              <a:latin typeface="Arial"/>
-            </a:endParaRPr>
-          </a:p>
-        </p:txBody>
-      </p:sp>
-      <p:sp>
-        <p:nvSpPr>
-          <p:cNvPr id="86" name="TextShape 2"/>
-          <p:cNvSpPr txBox="1"/>
+        <p:style>
+          <a:lnRef idx="0"/>
+          <a:fillRef idx="0"/>
+          <a:effectRef idx="0"/>
+          <a:fontRef idx="minor"/>
+        </p:style>
+      </p:sp>
+      <p:sp>
+        <p:nvSpPr>
+          <p:cNvPr id="127" name="CustomShape 2"/>
+          <p:cNvSpPr/>
           <p:nvPr/>
         </p:nvSpPr>
         <p:spPr>
           <a:xfrm>
             <a:off x="542880" y="1342440"/>
-            <a:ext cx="3515760" cy="3206160"/>
+            <a:ext cx="3515400" cy="3205800"/>
           </a:xfrm>
           <a:prstGeom prst="rect">
             <a:avLst/>
@@ -4228,12 +6211,21 @@
             <a:noFill/>
           </a:ln>
         </p:spPr>
+        <p:style>
+          <a:lnRef idx="0"/>
+          <a:fillRef idx="0"/>
+          <a:effectRef idx="0"/>
+          <a:fontRef idx="minor"/>
+        </p:style>
         <p:txBody>
           <a:bodyPr lIns="0" rIns="0" tIns="0" bIns="0">
             <a:normAutofit/>
           </a:bodyPr>
           <a:p>
-            <a:pPr marL="432000" indent="-324000">
+            <a:pPr marL="432000" indent="-323640">
+              <a:lnSpc>
+                <a:spcPct val="100000"/>
+              </a:lnSpc>
               <a:spcBef>
                 <a:spcPts val="1417"/>
               </a:spcBef>
@@ -4258,14 +6250,14 @@
       </p:sp>
       <p:sp>
         <p:nvSpPr>
-          <p:cNvPr id="87" name="TextShape 3"/>
-          <p:cNvSpPr txBox="1"/>
+          <p:cNvPr id="128" name="CustomShape 3"/>
+          <p:cNvSpPr/>
           <p:nvPr/>
         </p:nvSpPr>
         <p:spPr>
           <a:xfrm>
             <a:off x="4572000" y="1451160"/>
-            <a:ext cx="4572000" cy="3338280"/>
+            <a:ext cx="4571640" cy="3337920"/>
           </a:xfrm>
           <a:prstGeom prst="rect">
             <a:avLst/>
@@ -4275,16 +6267,12 @@
             <a:noFill/>
           </a:ln>
         </p:spPr>
-        <p:txBody>
-          <a:bodyPr lIns="0" rIns="0" tIns="0" bIns="0">
-            <a:normAutofit/>
-          </a:bodyPr>
-          <a:p>
-            <a:endParaRPr b="0" lang="en-US" sz="3200" spc="-1" strike="noStrike">
-              <a:latin typeface="Arial"/>
-            </a:endParaRPr>
-          </a:p>
-        </p:txBody>
+        <p:style>
+          <a:lnRef idx="0"/>
+          <a:fillRef idx="0"/>
+          <a:effectRef idx="0"/>
+          <a:fontRef idx="minor"/>
+        </p:style>
       </p:sp>
     </p:spTree>
   </p:cSld>
@@ -4743,4 +6731,227 @@
     </a:fmtScheme>
   </a:themeElements>
 </a:theme>
+</file>
+
+<file path=ppt/theme/theme3.xml><?xml version="1.0" encoding="utf-8"?>
+<a:theme xmlns:a="http://schemas.openxmlformats.org/drawingml/2006/main" name="Office Theme">
+  <a:themeElements>
+    <a:clrScheme name="Office">
+      <a:dk1>
+        <a:sysClr val="windowText" lastClr="000000"/>
+      </a:dk1>
+      <a:lt1>
+        <a:sysClr val="window" lastClr="FFFFFF"/>
+      </a:lt1>
+      <a:dk2>
+        <a:srgbClr val="1f497d"/>
+      </a:dk2>
+      <a:lt2>
+        <a:srgbClr val="eeece1"/>
+      </a:lt2>
+      <a:accent1>
+        <a:srgbClr val="4f81bd"/>
+      </a:accent1>
+      <a:accent2>
+        <a:srgbClr val="c0504d"/>
+      </a:accent2>
+      <a:accent3>
+        <a:srgbClr val="9bbb59"/>
+      </a:accent3>
+      <a:accent4>
+        <a:srgbClr val="8064a2"/>
+      </a:accent4>
+      <a:accent5>
+        <a:srgbClr val="4bacc6"/>
+      </a:accent5>
+      <a:accent6>
+        <a:srgbClr val="f79646"/>
+      </a:accent6>
+      <a:hlink>
+        <a:srgbClr val="0000ff"/>
+      </a:hlink>
+      <a:folHlink>
+        <a:srgbClr val="800080"/>
+      </a:folHlink>
+    </a:clrScheme>
+    <a:fontScheme name="Office">
+      <a:majorFont>
+        <a:latin typeface="Arial"/>
+        <a:ea typeface="DejaVu Sans"/>
+        <a:cs typeface="DejaVu Sans"/>
+      </a:majorFont>
+      <a:minorFont>
+        <a:latin typeface="Arial"/>
+        <a:ea typeface="DejaVu Sans"/>
+        <a:cs typeface="DejaVu Sans"/>
+      </a:minorFont>
+    </a:fontScheme>
+    <a:fmtScheme name="Office">
+      <a:fillStyleLst>
+        <a:solidFill>
+          <a:schemeClr val="phClr"/>
+        </a:solidFill>
+        <a:gradFill rotWithShape="1">
+          <a:gsLst>
+            <a:gs pos="0">
+              <a:schemeClr val="phClr">
+                <a:tint val="50000"/>
+                <a:satMod val="300000"/>
+              </a:schemeClr>
+            </a:gs>
+            <a:gs pos="35000">
+              <a:schemeClr val="phClr">
+                <a:tint val="37000"/>
+                <a:satMod val="300000"/>
+              </a:schemeClr>
+            </a:gs>
+            <a:gs pos="100000">
+              <a:schemeClr val="phClr">
+                <a:tint val="15000"/>
+                <a:satMod val="350000"/>
+              </a:schemeClr>
+            </a:gs>
+          </a:gsLst>
+          <a:lin ang="16200000" scaled="1"/>
+        </a:gradFill>
+        <a:gradFill rotWithShape="1">
+          <a:gsLst>
+            <a:gs pos="0">
+              <a:schemeClr val="phClr">
+                <a:shade val="51000"/>
+                <a:satMod val="130000"/>
+              </a:schemeClr>
+            </a:gs>
+            <a:gs pos="80000">
+              <a:schemeClr val="phClr">
+                <a:shade val="93000"/>
+                <a:satMod val="130000"/>
+              </a:schemeClr>
+            </a:gs>
+            <a:gs pos="100000">
+              <a:schemeClr val="phClr">
+                <a:shade val="94000"/>
+                <a:satMod val="135000"/>
+              </a:schemeClr>
+            </a:gs>
+          </a:gsLst>
+          <a:lin ang="16200000" scaled="0"/>
+        </a:gradFill>
+      </a:fillStyleLst>
+      <a:lnStyleLst>
+        <a:ln w="9525" cap="flat" cmpd="sng" algn="ctr">
+          <a:solidFill>
+            <a:schemeClr val="phClr">
+              <a:shade val="95000"/>
+              <a:satMod val="105000"/>
+            </a:schemeClr>
+          </a:solidFill>
+          <a:prstDash val="solid"/>
+        </a:ln>
+        <a:ln w="25400" cap="flat" cmpd="sng" algn="ctr">
+          <a:solidFill>
+            <a:schemeClr val="phClr"/>
+          </a:solidFill>
+          <a:prstDash val="solid"/>
+        </a:ln>
+        <a:ln w="38100" cap="flat" cmpd="sng" algn="ctr">
+          <a:solidFill>
+            <a:schemeClr val="phClr"/>
+          </a:solidFill>
+          <a:prstDash val="solid"/>
+        </a:ln>
+      </a:lnStyleLst>
+      <a:effectStyleLst>
+        <a:effectStyle>
+          <a:effectLst>
+            <a:outerShdw blurRad="40000" dist="20000" dir="5400000" rotWithShape="0">
+              <a:srgbClr val="000000">
+                <a:alpha val="38000"/>
+              </a:srgbClr>
+            </a:outerShdw>
+          </a:effectLst>
+        </a:effectStyle>
+        <a:effectStyle>
+          <a:effectLst>
+            <a:outerShdw blurRad="40000" dist="23000" dir="5400000" rotWithShape="0">
+              <a:srgbClr val="000000">
+                <a:alpha val="35000"/>
+              </a:srgbClr>
+            </a:outerShdw>
+          </a:effectLst>
+        </a:effectStyle>
+        <a:effectStyle>
+          <a:effectLst>
+            <a:outerShdw blurRad="40000" dist="23000" dir="5400000" rotWithShape="0">
+              <a:srgbClr val="000000">
+                <a:alpha val="35000"/>
+              </a:srgbClr>
+            </a:outerShdw>
+          </a:effectLst>
+          <a:scene3d>
+            <a:camera prst="orthographicFront">
+              <a:rot lat="0" lon="0" rev="0"/>
+            </a:camera>
+            <a:lightRig rig="threePt" dir="t">
+              <a:rot lat="0" lon="0" rev="1200000"/>
+            </a:lightRig>
+          </a:scene3d>
+          <a:sp3d>
+            <a:bevelT w="63500" h="25400"/>
+          </a:sp3d>
+        </a:effectStyle>
+      </a:effectStyleLst>
+      <a:bgFillStyleLst>
+        <a:solidFill>
+          <a:schemeClr val="phClr"/>
+        </a:solidFill>
+        <a:gradFill rotWithShape="1">
+          <a:gsLst>
+            <a:gs pos="0">
+              <a:schemeClr val="phClr">
+                <a:tint val="40000"/>
+                <a:satMod val="350000"/>
+              </a:schemeClr>
+            </a:gs>
+            <a:gs pos="40000">
+              <a:schemeClr val="phClr">
+                <a:tint val="45000"/>
+                <a:shade val="99000"/>
+                <a:satMod val="350000"/>
+              </a:schemeClr>
+            </a:gs>
+            <a:gs pos="100000">
+              <a:schemeClr val="phClr">
+                <a:shade val="20000"/>
+                <a:satMod val="255000"/>
+              </a:schemeClr>
+            </a:gs>
+          </a:gsLst>
+          <a:path path="circle">
+            <a:fillToRect l="50000" t="-80000" r="50000" b="180000"/>
+          </a:path>
+        </a:gradFill>
+        <a:gradFill rotWithShape="1">
+          <a:gsLst>
+            <a:gs pos="0">
+              <a:schemeClr val="phClr">
+                <a:tint val="80000"/>
+                <a:satMod val="300000"/>
+              </a:schemeClr>
+            </a:gs>
+            <a:gs pos="100000">
+              <a:schemeClr val="phClr">
+                <a:shade val="30000"/>
+                <a:satMod val="200000"/>
+              </a:schemeClr>
+            </a:gs>
+          </a:gsLst>
+          <a:path path="circle">
+            <a:fillToRect l="50000" t="50000" r="50000" b="50000"/>
+          </a:path>
+        </a:gradFill>
+      </a:bgFillStyleLst>
+    </a:fmtScheme>
+  </a:themeElements>
+</a:theme>
 </file>
</xml_diff>